<commit_message>
+ SVBRDF fitting problem
Le fichier ppt est mis à jour
</commit_message>
<xml_diff>
--- a/Slide/discussion.pptx
+++ b/Slide/discussion.pptx
@@ -7,6 +7,8 @@
   <p:sldIdLst>
     <p:sldId id="257" r:id="rId2"/>
     <p:sldId id="258" r:id="rId3"/>
+    <p:sldId id="259" r:id="rId4"/>
+    <p:sldId id="260" r:id="rId5"/>
   </p:sldIdLst>
   <p:sldSz cx="9144000" cy="6858000" type="screen4x3"/>
   <p:notesSz cx="6858000" cy="9144000"/>
@@ -296,7 +298,7 @@
           <a:p>
             <a:fld id="{07BE1092-F7C4-4CFF-A7EF-99DF9CEB52D3}" type="datetimeFigureOut">
               <a:rPr lang="fr-FR" smtClean="0"/>
-              <a:t>04/03/2016</a:t>
+              <a:t>23/03/2016</a:t>
             </a:fld>
             <a:endParaRPr lang="fr-FR"/>
           </a:p>
@@ -496,7 +498,7 @@
           <a:p>
             <a:fld id="{07BE1092-F7C4-4CFF-A7EF-99DF9CEB52D3}" type="datetimeFigureOut">
               <a:rPr lang="fr-FR" smtClean="0"/>
-              <a:t>04/03/2016</a:t>
+              <a:t>23/03/2016</a:t>
             </a:fld>
             <a:endParaRPr lang="fr-FR"/>
           </a:p>
@@ -671,7 +673,7 @@
           <a:p>
             <a:fld id="{07BE1092-F7C4-4CFF-A7EF-99DF9CEB52D3}" type="datetimeFigureOut">
               <a:rPr lang="fr-FR" smtClean="0"/>
-              <a:t>04/03/2016</a:t>
+              <a:t>23/03/2016</a:t>
             </a:fld>
             <a:endParaRPr lang="fr-FR"/>
           </a:p>
@@ -836,7 +838,7 @@
           <a:p>
             <a:fld id="{07BE1092-F7C4-4CFF-A7EF-99DF9CEB52D3}" type="datetimeFigureOut">
               <a:rPr lang="fr-FR" smtClean="0"/>
-              <a:t>04/03/2016</a:t>
+              <a:t>23/03/2016</a:t>
             </a:fld>
             <a:endParaRPr lang="fr-FR"/>
           </a:p>
@@ -1084,7 +1086,7 @@
           <a:p>
             <a:fld id="{07BE1092-F7C4-4CFF-A7EF-99DF9CEB52D3}" type="datetimeFigureOut">
               <a:rPr lang="fr-FR" smtClean="0"/>
-              <a:t>04/03/2016</a:t>
+              <a:t>23/03/2016</a:t>
             </a:fld>
             <a:endParaRPr lang="fr-FR"/>
           </a:p>
@@ -1402,7 +1404,7 @@
           <a:p>
             <a:fld id="{07BE1092-F7C4-4CFF-A7EF-99DF9CEB52D3}" type="datetimeFigureOut">
               <a:rPr lang="fr-FR" smtClean="0"/>
-              <a:t>04/03/2016</a:t>
+              <a:t>23/03/2016</a:t>
             </a:fld>
             <a:endParaRPr lang="fr-FR"/>
           </a:p>
@@ -1868,7 +1870,7 @@
           <a:p>
             <a:fld id="{07BE1092-F7C4-4CFF-A7EF-99DF9CEB52D3}" type="datetimeFigureOut">
               <a:rPr lang="fr-FR" smtClean="0"/>
-              <a:t>04/03/2016</a:t>
+              <a:t>23/03/2016</a:t>
             </a:fld>
             <a:endParaRPr lang="fr-FR"/>
           </a:p>
@@ -2016,7 +2018,7 @@
           <a:p>
             <a:fld id="{07BE1092-F7C4-4CFF-A7EF-99DF9CEB52D3}" type="datetimeFigureOut">
               <a:rPr lang="fr-FR" smtClean="0"/>
-              <a:t>04/03/2016</a:t>
+              <a:t>23/03/2016</a:t>
             </a:fld>
             <a:endParaRPr lang="fr-FR"/>
           </a:p>
@@ -2106,7 +2108,7 @@
           <a:p>
             <a:fld id="{07BE1092-F7C4-4CFF-A7EF-99DF9CEB52D3}" type="datetimeFigureOut">
               <a:rPr lang="fr-FR" smtClean="0"/>
-              <a:t>04/03/2016</a:t>
+              <a:t>23/03/2016</a:t>
             </a:fld>
             <a:endParaRPr lang="fr-FR"/>
           </a:p>
@@ -2380,7 +2382,7 @@
           <a:p>
             <a:fld id="{07BE1092-F7C4-4CFF-A7EF-99DF9CEB52D3}" type="datetimeFigureOut">
               <a:rPr lang="fr-FR" smtClean="0"/>
-              <a:t>04/03/2016</a:t>
+              <a:t>23/03/2016</a:t>
             </a:fld>
             <a:endParaRPr lang="fr-FR"/>
           </a:p>
@@ -2685,7 +2687,7 @@
           <a:p>
             <a:fld id="{07BE1092-F7C4-4CFF-A7EF-99DF9CEB52D3}" type="datetimeFigureOut">
               <a:rPr lang="fr-FR" smtClean="0"/>
-              <a:t>04/03/2016</a:t>
+              <a:t>23/03/2016</a:t>
             </a:fld>
             <a:endParaRPr lang="fr-FR"/>
           </a:p>
@@ -2983,7 +2985,7 @@
           <a:p>
             <a:fld id="{07BE1092-F7C4-4CFF-A7EF-99DF9CEB52D3}" type="datetimeFigureOut">
               <a:rPr lang="fr-FR" smtClean="0"/>
-              <a:t>04/03/2016</a:t>
+              <a:t>23/03/2016</a:t>
             </a:fld>
             <a:endParaRPr lang="fr-FR"/>
           </a:p>
@@ -4477,7 +4479,23 @@
                   <a:srgbClr val="FF0000"/>
                 </a:solidFill>
               </a:rPr>
-              <a:t>Reverse transport: Transfert du pixel du master vers tous les </a:t>
+              <a:t>Reverse transport: Transfert du pixel </a:t>
+            </a:r>
+            <a:r>
+              <a:rPr lang="fr-FR" sz="1200" smtClean="0">
+                <a:solidFill>
+                  <a:srgbClr val="FF0000"/>
+                </a:solidFill>
+              </a:rPr>
+              <a:t>du nouveau master </a:t>
+            </a:r>
+            <a:r>
+              <a:rPr lang="fr-FR" sz="1200" dirty="0" smtClean="0">
+                <a:solidFill>
+                  <a:srgbClr val="FF0000"/>
+                </a:solidFill>
+              </a:rPr>
+              <a:t>vers tous les </a:t>
             </a:r>
             <a:r>
               <a:rPr lang="fr-FR" sz="1200" dirty="0" err="1" smtClean="0">
@@ -4740,6 +4758,1517 @@
     <p:extLst>
       <p:ext uri="{BB962C8B-B14F-4D97-AF65-F5344CB8AC3E}">
         <p14:creationId xmlns:p14="http://schemas.microsoft.com/office/powerpoint/2010/main" val="481752261"/>
+      </p:ext>
+    </p:extLst>
+  </p:cSld>
+  <p:clrMapOvr>
+    <a:masterClrMapping/>
+  </p:clrMapOvr>
+  <p:timing>
+    <p:tnLst>
+      <p:par>
+        <p:cTn id="1" dur="indefinite" restart="never" nodeType="tmRoot"/>
+      </p:par>
+    </p:tnLst>
+  </p:timing>
+</p:sld>
+</file>
+
+<file path=ppt/slides/slide3.xml><?xml version="1.0" encoding="utf-8"?>
+<p:sld xmlns:a="http://schemas.openxmlformats.org/drawingml/2006/main" xmlns:r="http://schemas.openxmlformats.org/officeDocument/2006/relationships" xmlns:p="http://schemas.openxmlformats.org/presentationml/2006/main">
+  <p:cSld>
+    <p:spTree>
+      <p:nvGrpSpPr>
+        <p:cNvPr id="1" name=""/>
+        <p:cNvGrpSpPr/>
+        <p:nvPr/>
+      </p:nvGrpSpPr>
+      <p:grpSpPr>
+        <a:xfrm>
+          <a:off x="0" y="0"/>
+          <a:ext cx="0" cy="0"/>
+          <a:chOff x="0" y="0"/>
+          <a:chExt cx="0" cy="0"/>
+        </a:xfrm>
+      </p:grpSpPr>
+      <p:sp>
+        <p:nvSpPr>
+          <p:cNvPr id="2" name="Titre 1"/>
+          <p:cNvSpPr>
+            <a:spLocks noGrp="1"/>
+          </p:cNvSpPr>
+          <p:nvPr>
+            <p:ph type="title"/>
+          </p:nvPr>
+        </p:nvSpPr>
+        <p:spPr/>
+        <p:txBody>
+          <a:bodyPr>
+            <a:normAutofit fontScale="90000"/>
+          </a:bodyPr>
+          <a:lstStyle/>
+          <a:p>
+            <a:r>
+              <a:rPr lang="fr-FR" dirty="0" smtClean="0"/>
+              <a:t>Optimisation des paramètres SVBRDF (ANNEXE </a:t>
+            </a:r>
+            <a:r>
+              <a:rPr lang="fr-FR" dirty="0" smtClean="0"/>
+              <a:t>B &amp; C)</a:t>
+            </a:r>
+            <a:endParaRPr lang="fr-FR" dirty="0"/>
+          </a:p>
+        </p:txBody>
+      </p:sp>
+      <p:sp>
+        <p:nvSpPr>
+          <p:cNvPr id="4" name="Rectangle 3"/>
+          <p:cNvSpPr/>
+          <p:nvPr/>
+        </p:nvSpPr>
+        <p:spPr>
+          <a:xfrm>
+            <a:off x="683568" y="1916832"/>
+            <a:ext cx="4968552" cy="2808312"/>
+          </a:xfrm>
+          <a:prstGeom prst="rect">
+            <a:avLst/>
+          </a:prstGeom>
+          <a:solidFill>
+            <a:schemeClr val="tx2">
+              <a:lumMod val="40000"/>
+              <a:lumOff val="60000"/>
+            </a:schemeClr>
+          </a:solidFill>
+        </p:spPr>
+        <p:style>
+          <a:lnRef idx="2">
+            <a:schemeClr val="accent1">
+              <a:shade val="50000"/>
+            </a:schemeClr>
+          </a:lnRef>
+          <a:fillRef idx="1">
+            <a:schemeClr val="accent1"/>
+          </a:fillRef>
+          <a:effectRef idx="0">
+            <a:schemeClr val="accent1"/>
+          </a:effectRef>
+          <a:fontRef idx="minor">
+            <a:schemeClr val="lt1"/>
+          </a:fontRef>
+        </p:style>
+        <p:txBody>
+          <a:bodyPr numCol="2" rtlCol="0" anchor="ctr"/>
+          <a:lstStyle/>
+          <a:p>
+            <a:r>
+              <a:rPr lang="fr-FR" dirty="0" smtClean="0"/>
+              <a:t>INPUT IMAGE</a:t>
+            </a:r>
+            <a:endParaRPr lang="fr-FR" dirty="0"/>
+          </a:p>
+        </p:txBody>
+      </p:sp>
+      <p:sp>
+        <p:nvSpPr>
+          <p:cNvPr id="5" name="Organigramme : Jonction de sommaire 4"/>
+          <p:cNvSpPr/>
+          <p:nvPr/>
+        </p:nvSpPr>
+        <p:spPr>
+          <a:xfrm>
+            <a:off x="2987824" y="3176972"/>
+            <a:ext cx="288032" cy="288032"/>
+          </a:xfrm>
+          <a:prstGeom prst="flowChartSummingJunction">
+            <a:avLst/>
+          </a:prstGeom>
+        </p:spPr>
+        <p:style>
+          <a:lnRef idx="2">
+            <a:schemeClr val="accent1">
+              <a:shade val="50000"/>
+            </a:schemeClr>
+          </a:lnRef>
+          <a:fillRef idx="1">
+            <a:schemeClr val="accent1"/>
+          </a:fillRef>
+          <a:effectRef idx="0">
+            <a:schemeClr val="accent1"/>
+          </a:effectRef>
+          <a:fontRef idx="minor">
+            <a:schemeClr val="lt1"/>
+          </a:fontRef>
+        </p:style>
+        <p:txBody>
+          <a:bodyPr rtlCol="0" anchor="ctr"/>
+          <a:lstStyle/>
+          <a:p>
+            <a:pPr algn="ctr"/>
+            <a:r>
+              <a:rPr lang="fr-FR" dirty="0" smtClean="0"/>
+              <a:t>E</a:t>
+            </a:r>
+            <a:endParaRPr lang="fr-FR" dirty="0"/>
+          </a:p>
+        </p:txBody>
+      </p:sp>
+      <p:sp>
+        <p:nvSpPr>
+          <p:cNvPr id="7" name="Organigramme : Jonction de sommaire 6"/>
+          <p:cNvSpPr/>
+          <p:nvPr/>
+        </p:nvSpPr>
+        <p:spPr>
+          <a:xfrm>
+            <a:off x="5940152" y="1772816"/>
+            <a:ext cx="288032" cy="288032"/>
+          </a:xfrm>
+          <a:prstGeom prst="flowChartSummingJunction">
+            <a:avLst/>
+          </a:prstGeom>
+        </p:spPr>
+        <p:style>
+          <a:lnRef idx="2">
+            <a:schemeClr val="accent1">
+              <a:shade val="50000"/>
+            </a:schemeClr>
+          </a:lnRef>
+          <a:fillRef idx="1">
+            <a:schemeClr val="accent1"/>
+          </a:fillRef>
+          <a:effectRef idx="0">
+            <a:schemeClr val="accent1"/>
+          </a:effectRef>
+          <a:fontRef idx="minor">
+            <a:schemeClr val="lt1"/>
+          </a:fontRef>
+        </p:style>
+        <p:txBody>
+          <a:bodyPr rtlCol="0" anchor="ctr"/>
+          <a:lstStyle/>
+          <a:p>
+            <a:pPr algn="ctr"/>
+            <a:r>
+              <a:rPr lang="fr-FR" dirty="0" smtClean="0"/>
+              <a:t>E</a:t>
+            </a:r>
+            <a:endParaRPr lang="fr-FR" dirty="0"/>
+          </a:p>
+        </p:txBody>
+      </p:sp>
+      <p:sp>
+        <p:nvSpPr>
+          <p:cNvPr id="8" name="ZoneTexte 7"/>
+          <p:cNvSpPr txBox="1"/>
+          <p:nvPr/>
+        </p:nvSpPr>
+        <p:spPr>
+          <a:xfrm>
+            <a:off x="6253465" y="1786027"/>
+            <a:ext cx="1835759" cy="261610"/>
+          </a:xfrm>
+          <a:prstGeom prst="rect">
+            <a:avLst/>
+          </a:prstGeom>
+          <a:noFill/>
+        </p:spPr>
+        <p:txBody>
+          <a:bodyPr wrap="none" rtlCol="0">
+            <a:spAutoFit/>
+          </a:bodyPr>
+          <a:lstStyle/>
+          <a:p>
+            <a:r>
+              <a:rPr lang="fr-FR" sz="1050" dirty="0" smtClean="0"/>
+              <a:t>Position du caméra (0,0,1)</a:t>
+            </a:r>
+            <a:endParaRPr lang="fr-FR" dirty="0"/>
+          </a:p>
+        </p:txBody>
+      </p:sp>
+      <p:cxnSp>
+        <p:nvCxnSpPr>
+          <p:cNvPr id="10" name="Connecteur droit avec flèche 9"/>
+          <p:cNvCxnSpPr/>
+          <p:nvPr/>
+        </p:nvCxnSpPr>
+        <p:spPr>
+          <a:xfrm>
+            <a:off x="611560" y="1844824"/>
+            <a:ext cx="0" cy="720080"/>
+          </a:xfrm>
+          <a:prstGeom prst="straightConnector1">
+            <a:avLst/>
+          </a:prstGeom>
+          <a:ln>
+            <a:tailEnd type="arrow"/>
+          </a:ln>
+        </p:spPr>
+        <p:style>
+          <a:lnRef idx="1">
+            <a:schemeClr val="accent1"/>
+          </a:lnRef>
+          <a:fillRef idx="0">
+            <a:schemeClr val="accent1"/>
+          </a:fillRef>
+          <a:effectRef idx="0">
+            <a:schemeClr val="accent1"/>
+          </a:effectRef>
+          <a:fontRef idx="minor">
+            <a:schemeClr val="tx1"/>
+          </a:fontRef>
+        </p:style>
+      </p:cxnSp>
+      <p:cxnSp>
+        <p:nvCxnSpPr>
+          <p:cNvPr id="11" name="Connecteur droit avec flèche 10"/>
+          <p:cNvCxnSpPr/>
+          <p:nvPr/>
+        </p:nvCxnSpPr>
+        <p:spPr>
+          <a:xfrm>
+            <a:off x="611560" y="1844824"/>
+            <a:ext cx="639688" cy="0"/>
+          </a:xfrm>
+          <a:prstGeom prst="straightConnector1">
+            <a:avLst/>
+          </a:prstGeom>
+          <a:ln>
+            <a:tailEnd type="arrow"/>
+          </a:ln>
+        </p:spPr>
+        <p:style>
+          <a:lnRef idx="1">
+            <a:schemeClr val="accent1"/>
+          </a:lnRef>
+          <a:fillRef idx="0">
+            <a:schemeClr val="accent1"/>
+          </a:fillRef>
+          <a:effectRef idx="0">
+            <a:schemeClr val="accent1"/>
+          </a:effectRef>
+          <a:fontRef idx="minor">
+            <a:schemeClr val="tx1"/>
+          </a:fontRef>
+        </p:style>
+      </p:cxnSp>
+      <p:sp>
+        <p:nvSpPr>
+          <p:cNvPr id="14" name="ZoneTexte 13"/>
+          <p:cNvSpPr txBox="1"/>
+          <p:nvPr/>
+        </p:nvSpPr>
+        <p:spPr>
+          <a:xfrm>
+            <a:off x="607637" y="1637197"/>
+            <a:ext cx="274434" cy="530915"/>
+          </a:xfrm>
+          <a:prstGeom prst="rect">
+            <a:avLst/>
+          </a:prstGeom>
+          <a:noFill/>
+        </p:spPr>
+        <p:txBody>
+          <a:bodyPr wrap="none" rtlCol="0">
+            <a:spAutoFit/>
+          </a:bodyPr>
+          <a:lstStyle/>
+          <a:p>
+            <a:r>
+              <a:rPr lang="fr-FR" sz="1050" dirty="0" smtClean="0"/>
+              <a:t>X</a:t>
+            </a:r>
+          </a:p>
+          <a:p>
+            <a:endParaRPr lang="fr-FR" dirty="0"/>
+          </a:p>
+        </p:txBody>
+      </p:sp>
+      <p:sp>
+        <p:nvSpPr>
+          <p:cNvPr id="15" name="ZoneTexte 14"/>
+          <p:cNvSpPr txBox="1"/>
+          <p:nvPr/>
+        </p:nvSpPr>
+        <p:spPr>
+          <a:xfrm>
+            <a:off x="324183" y="1983446"/>
+            <a:ext cx="300082" cy="369332"/>
+          </a:xfrm>
+          <a:prstGeom prst="rect">
+            <a:avLst/>
+          </a:prstGeom>
+          <a:noFill/>
+        </p:spPr>
+        <p:txBody>
+          <a:bodyPr wrap="none" rtlCol="0">
+            <a:spAutoFit/>
+          </a:bodyPr>
+          <a:lstStyle/>
+          <a:p>
+            <a:r>
+              <a:rPr lang="fr-FR" dirty="0" smtClean="0"/>
+              <a:t>y</a:t>
+            </a:r>
+            <a:endParaRPr lang="fr-FR" dirty="0"/>
+          </a:p>
+        </p:txBody>
+      </p:sp>
+      <p:sp>
+        <p:nvSpPr>
+          <p:cNvPr id="16" name="Multiplier 15"/>
+          <p:cNvSpPr/>
+          <p:nvPr/>
+        </p:nvSpPr>
+        <p:spPr>
+          <a:xfrm>
+            <a:off x="1251248" y="2352778"/>
+            <a:ext cx="224408" cy="212126"/>
+          </a:xfrm>
+          <a:prstGeom prst="mathMultiply">
+            <a:avLst/>
+          </a:prstGeom>
+          <a:solidFill>
+            <a:schemeClr val="tx2"/>
+          </a:solidFill>
+        </p:spPr>
+        <p:style>
+          <a:lnRef idx="2">
+            <a:schemeClr val="accent1">
+              <a:shade val="50000"/>
+            </a:schemeClr>
+          </a:lnRef>
+          <a:fillRef idx="1">
+            <a:schemeClr val="accent1"/>
+          </a:fillRef>
+          <a:effectRef idx="0">
+            <a:schemeClr val="accent1"/>
+          </a:effectRef>
+          <a:fontRef idx="minor">
+            <a:schemeClr val="lt1"/>
+          </a:fontRef>
+        </p:style>
+        <p:txBody>
+          <a:bodyPr rtlCol="0" anchor="ctr"/>
+          <a:lstStyle/>
+          <a:p>
+            <a:pPr algn="ctr"/>
+            <a:endParaRPr lang="fr-FR">
+              <a:solidFill>
+                <a:srgbClr val="FF0000"/>
+              </a:solidFill>
+            </a:endParaRPr>
+          </a:p>
+        </p:txBody>
+      </p:sp>
+      <p:sp>
+        <p:nvSpPr>
+          <p:cNvPr id="17" name="Multiplier 16"/>
+          <p:cNvSpPr/>
+          <p:nvPr/>
+        </p:nvSpPr>
+        <p:spPr>
+          <a:xfrm>
+            <a:off x="5989931" y="2297826"/>
+            <a:ext cx="224408" cy="212126"/>
+          </a:xfrm>
+          <a:prstGeom prst="mathMultiply">
+            <a:avLst/>
+          </a:prstGeom>
+          <a:solidFill>
+            <a:schemeClr val="tx2"/>
+          </a:solidFill>
+        </p:spPr>
+        <p:style>
+          <a:lnRef idx="2">
+            <a:schemeClr val="accent1">
+              <a:shade val="50000"/>
+            </a:schemeClr>
+          </a:lnRef>
+          <a:fillRef idx="1">
+            <a:schemeClr val="accent1"/>
+          </a:fillRef>
+          <a:effectRef idx="0">
+            <a:schemeClr val="accent1"/>
+          </a:effectRef>
+          <a:fontRef idx="minor">
+            <a:schemeClr val="lt1"/>
+          </a:fontRef>
+        </p:style>
+        <p:txBody>
+          <a:bodyPr rtlCol="0" anchor="ctr"/>
+          <a:lstStyle/>
+          <a:p>
+            <a:pPr algn="ctr"/>
+            <a:endParaRPr lang="fr-FR">
+              <a:solidFill>
+                <a:srgbClr val="FF0000"/>
+              </a:solidFill>
+            </a:endParaRPr>
+          </a:p>
+        </p:txBody>
+      </p:sp>
+      <p:sp>
+        <p:nvSpPr>
+          <p:cNvPr id="18" name="ZoneTexte 17"/>
+          <p:cNvSpPr txBox="1"/>
+          <p:nvPr/>
+        </p:nvSpPr>
+        <p:spPr>
+          <a:xfrm>
+            <a:off x="6253465" y="2240594"/>
+            <a:ext cx="2901756" cy="253916"/>
+          </a:xfrm>
+          <a:prstGeom prst="rect">
+            <a:avLst/>
+          </a:prstGeom>
+          <a:noFill/>
+        </p:spPr>
+        <p:txBody>
+          <a:bodyPr wrap="none" rtlCol="0">
+            <a:spAutoFit/>
+          </a:bodyPr>
+          <a:lstStyle/>
+          <a:p>
+            <a:r>
+              <a:rPr lang="fr-FR" sz="1050" dirty="0" smtClean="0"/>
+              <a:t>Pixel p(</a:t>
+            </a:r>
+            <a:r>
+              <a:rPr lang="fr-FR" sz="1050" dirty="0" err="1" smtClean="0"/>
+              <a:t>x,y</a:t>
+            </a:r>
+            <a:r>
+              <a:rPr lang="fr-FR" sz="1050" dirty="0" smtClean="0"/>
+              <a:t>) sera transformé en Pixel P(X,Y,Z)</a:t>
+            </a:r>
+            <a:endParaRPr lang="fr-FR" dirty="0"/>
+          </a:p>
+        </p:txBody>
+      </p:sp>
+      <p:sp>
+        <p:nvSpPr>
+          <p:cNvPr id="19" name="Flèche droite 18"/>
+          <p:cNvSpPr/>
+          <p:nvPr/>
+        </p:nvSpPr>
+        <p:spPr>
+          <a:xfrm rot="1704198">
+            <a:off x="1373681" y="2562221"/>
+            <a:ext cx="616260" cy="198968"/>
+          </a:xfrm>
+          <a:prstGeom prst="rightArrow">
+            <a:avLst/>
+          </a:prstGeom>
+          <a:solidFill>
+            <a:schemeClr val="tx1">
+              <a:lumMod val="75000"/>
+              <a:lumOff val="25000"/>
+            </a:schemeClr>
+          </a:solidFill>
+        </p:spPr>
+        <p:style>
+          <a:lnRef idx="2">
+            <a:schemeClr val="accent1">
+              <a:shade val="50000"/>
+            </a:schemeClr>
+          </a:lnRef>
+          <a:fillRef idx="1">
+            <a:schemeClr val="accent1"/>
+          </a:fillRef>
+          <a:effectRef idx="0">
+            <a:schemeClr val="accent1"/>
+          </a:effectRef>
+          <a:fontRef idx="minor">
+            <a:schemeClr val="lt1"/>
+          </a:fontRef>
+        </p:style>
+        <p:txBody>
+          <a:bodyPr rtlCol="0" anchor="ctr"/>
+          <a:lstStyle/>
+          <a:p>
+            <a:pPr algn="ctr"/>
+            <a:endParaRPr lang="fr-FR"/>
+          </a:p>
+        </p:txBody>
+      </p:sp>
+      <p:sp>
+        <p:nvSpPr>
+          <p:cNvPr id="20" name="Flèche droite 19"/>
+          <p:cNvSpPr/>
+          <p:nvPr/>
+        </p:nvSpPr>
+        <p:spPr>
+          <a:xfrm>
+            <a:off x="5776038" y="2696815"/>
+            <a:ext cx="616260" cy="198968"/>
+          </a:xfrm>
+          <a:prstGeom prst="rightArrow">
+            <a:avLst/>
+          </a:prstGeom>
+          <a:solidFill>
+            <a:schemeClr val="tx1">
+              <a:lumMod val="75000"/>
+              <a:lumOff val="25000"/>
+            </a:schemeClr>
+          </a:solidFill>
+        </p:spPr>
+        <p:style>
+          <a:lnRef idx="2">
+            <a:schemeClr val="accent1">
+              <a:shade val="50000"/>
+            </a:schemeClr>
+          </a:lnRef>
+          <a:fillRef idx="1">
+            <a:schemeClr val="accent1"/>
+          </a:fillRef>
+          <a:effectRef idx="0">
+            <a:schemeClr val="accent1"/>
+          </a:effectRef>
+          <a:fontRef idx="minor">
+            <a:schemeClr val="lt1"/>
+          </a:fontRef>
+        </p:style>
+        <p:txBody>
+          <a:bodyPr rtlCol="0" anchor="ctr"/>
+          <a:lstStyle/>
+          <a:p>
+            <a:pPr algn="ctr"/>
+            <a:endParaRPr lang="fr-FR"/>
+          </a:p>
+        </p:txBody>
+      </p:sp>
+      <p:sp>
+        <p:nvSpPr>
+          <p:cNvPr id="21" name="ZoneTexte 20"/>
+          <p:cNvSpPr txBox="1"/>
+          <p:nvPr/>
+        </p:nvSpPr>
+        <p:spPr>
+          <a:xfrm>
+            <a:off x="6407353" y="2640885"/>
+            <a:ext cx="941283" cy="253916"/>
+          </a:xfrm>
+          <a:prstGeom prst="rect">
+            <a:avLst/>
+          </a:prstGeom>
+          <a:noFill/>
+        </p:spPr>
+        <p:txBody>
+          <a:bodyPr wrap="none" rtlCol="0">
+            <a:spAutoFit/>
+          </a:bodyPr>
+          <a:lstStyle/>
+          <a:p>
+            <a:r>
+              <a:rPr lang="fr-FR" sz="1050" dirty="0" smtClean="0"/>
+              <a:t>Half </a:t>
+            </a:r>
+            <a:r>
+              <a:rPr lang="fr-FR" sz="1050" dirty="0" err="1" smtClean="0"/>
+              <a:t>vector</a:t>
+            </a:r>
+            <a:r>
+              <a:rPr lang="fr-FR" sz="1050" dirty="0"/>
+              <a:t> h</a:t>
+            </a:r>
+            <a:endParaRPr lang="fr-FR" dirty="0"/>
+          </a:p>
+        </p:txBody>
+      </p:sp>
+      <p:pic>
+        <p:nvPicPr>
+          <p:cNvPr id="1026" name="Picture 2"/>
+          <p:cNvPicPr>
+            <a:picLocks noGrp="1" noChangeAspect="1" noChangeArrowheads="1"/>
+          </p:cNvPicPr>
+          <p:nvPr>
+            <p:ph idx="1"/>
+          </p:nvPr>
+        </p:nvPicPr>
+        <p:blipFill>
+          <a:blip r:embed="rId2">
+            <a:extLst>
+              <a:ext uri="{28A0092B-C50C-407E-A947-70E740481C1C}">
+                <a14:useLocalDpi xmlns:a14="http://schemas.microsoft.com/office/drawing/2010/main" val="0"/>
+              </a:ext>
+            </a:extLst>
+          </a:blip>
+          <a:srcRect/>
+          <a:stretch>
+            <a:fillRect/>
+          </a:stretch>
+        </p:blipFill>
+        <p:spPr bwMode="auto">
+          <a:xfrm>
+            <a:off x="1459148" y="5050775"/>
+            <a:ext cx="2247900" cy="438150"/>
+          </a:xfrm>
+          <a:prstGeom prst="rect">
+            <a:avLst/>
+          </a:prstGeom>
+          <a:noFill/>
+          <a:ln>
+            <a:noFill/>
+          </a:ln>
+          <a:extLst>
+            <a:ext uri="{909E8E84-426E-40DD-AFC4-6F175D3DCCD1}">
+              <a14:hiddenFill xmlns:a14="http://schemas.microsoft.com/office/drawing/2010/main">
+                <a:solidFill>
+                  <a:schemeClr val="accent1"/>
+                </a:solidFill>
+              </a14:hiddenFill>
+            </a:ext>
+            <a:ext uri="{91240B29-F687-4F45-9708-019B960494DF}">
+              <a14:hiddenLine xmlns:a14="http://schemas.microsoft.com/office/drawing/2010/main" w="9525">
+                <a:solidFill>
+                  <a:schemeClr val="tx1"/>
+                </a:solidFill>
+                <a:miter lim="800000"/>
+                <a:headEnd/>
+                <a:tailEnd/>
+              </a14:hiddenLine>
+            </a:ext>
+          </a:extLst>
+        </p:spPr>
+      </p:pic>
+      <p:sp>
+        <p:nvSpPr>
+          <p:cNvPr id="6" name="ZoneTexte 5"/>
+          <p:cNvSpPr txBox="1"/>
+          <p:nvPr/>
+        </p:nvSpPr>
+        <p:spPr>
+          <a:xfrm>
+            <a:off x="474223" y="5085184"/>
+            <a:ext cx="1207587" cy="369332"/>
+          </a:xfrm>
+          <a:prstGeom prst="rect">
+            <a:avLst/>
+          </a:prstGeom>
+          <a:noFill/>
+        </p:spPr>
+        <p:txBody>
+          <a:bodyPr wrap="square" rtlCol="0">
+            <a:spAutoFit/>
+          </a:bodyPr>
+          <a:lstStyle/>
+          <a:p>
+            <a:r>
+              <a:rPr lang="fr-FR" dirty="0" smtClean="0"/>
+              <a:t>Modèle=</a:t>
+            </a:r>
+            <a:endParaRPr lang="fr-FR" dirty="0"/>
+          </a:p>
+        </p:txBody>
+      </p:sp>
+      <p:pic>
+        <p:nvPicPr>
+          <p:cNvPr id="1027" name="Picture 3"/>
+          <p:cNvPicPr>
+            <a:picLocks noChangeAspect="1" noChangeArrowheads="1"/>
+          </p:cNvPicPr>
+          <p:nvPr/>
+        </p:nvPicPr>
+        <p:blipFill>
+          <a:blip r:embed="rId3">
+            <a:extLst>
+              <a:ext uri="{28A0092B-C50C-407E-A947-70E740481C1C}">
+                <a14:useLocalDpi xmlns:a14="http://schemas.microsoft.com/office/drawing/2010/main" val="0"/>
+              </a:ext>
+            </a:extLst>
+          </a:blip>
+          <a:srcRect/>
+          <a:stretch>
+            <a:fillRect/>
+          </a:stretch>
+        </p:blipFill>
+        <p:spPr bwMode="auto">
+          <a:xfrm>
+            <a:off x="561256" y="5454516"/>
+            <a:ext cx="1828800" cy="314325"/>
+          </a:xfrm>
+          <a:prstGeom prst="rect">
+            <a:avLst/>
+          </a:prstGeom>
+          <a:noFill/>
+          <a:ln>
+            <a:noFill/>
+          </a:ln>
+          <a:extLst>
+            <a:ext uri="{909E8E84-426E-40DD-AFC4-6F175D3DCCD1}">
+              <a14:hiddenFill xmlns:a14="http://schemas.microsoft.com/office/drawing/2010/main">
+                <a:solidFill>
+                  <a:schemeClr val="accent1"/>
+                </a:solidFill>
+              </a14:hiddenFill>
+            </a:ext>
+            <a:ext uri="{91240B29-F687-4F45-9708-019B960494DF}">
+              <a14:hiddenLine xmlns:a14="http://schemas.microsoft.com/office/drawing/2010/main" w="9525">
+                <a:solidFill>
+                  <a:schemeClr val="tx1"/>
+                </a:solidFill>
+                <a:miter lim="800000"/>
+                <a:headEnd/>
+                <a:tailEnd/>
+              </a14:hiddenLine>
+            </a:ext>
+          </a:extLst>
+        </p:spPr>
+      </p:pic>
+      <p:pic>
+        <p:nvPicPr>
+          <p:cNvPr id="1028" name="Picture 4"/>
+          <p:cNvPicPr>
+            <a:picLocks noChangeAspect="1" noChangeArrowheads="1"/>
+          </p:cNvPicPr>
+          <p:nvPr/>
+        </p:nvPicPr>
+        <p:blipFill>
+          <a:blip r:embed="rId4">
+            <a:extLst>
+              <a:ext uri="{28A0092B-C50C-407E-A947-70E740481C1C}">
+                <a14:useLocalDpi xmlns:a14="http://schemas.microsoft.com/office/drawing/2010/main" val="0"/>
+              </a:ext>
+            </a:extLst>
+          </a:blip>
+          <a:srcRect/>
+          <a:stretch>
+            <a:fillRect/>
+          </a:stretch>
+        </p:blipFill>
+        <p:spPr bwMode="auto">
+          <a:xfrm>
+            <a:off x="473106" y="5768841"/>
+            <a:ext cx="1495425" cy="276225"/>
+          </a:xfrm>
+          <a:prstGeom prst="rect">
+            <a:avLst/>
+          </a:prstGeom>
+          <a:noFill/>
+          <a:ln>
+            <a:noFill/>
+          </a:ln>
+          <a:extLst>
+            <a:ext uri="{909E8E84-426E-40DD-AFC4-6F175D3DCCD1}">
+              <a14:hiddenFill xmlns:a14="http://schemas.microsoft.com/office/drawing/2010/main">
+                <a:solidFill>
+                  <a:schemeClr val="accent1"/>
+                </a:solidFill>
+              </a14:hiddenFill>
+            </a:ext>
+            <a:ext uri="{91240B29-F687-4F45-9708-019B960494DF}">
+              <a14:hiddenLine xmlns:a14="http://schemas.microsoft.com/office/drawing/2010/main" w="9525">
+                <a:solidFill>
+                  <a:schemeClr val="tx1"/>
+                </a:solidFill>
+                <a:miter lim="800000"/>
+                <a:headEnd/>
+                <a:tailEnd/>
+              </a14:hiddenLine>
+            </a:ext>
+          </a:extLst>
+        </p:spPr>
+      </p:pic>
+      <p:pic>
+        <p:nvPicPr>
+          <p:cNvPr id="1029" name="Picture 5"/>
+          <p:cNvPicPr>
+            <a:picLocks noChangeAspect="1" noChangeArrowheads="1"/>
+          </p:cNvPicPr>
+          <p:nvPr/>
+        </p:nvPicPr>
+        <p:blipFill>
+          <a:blip r:embed="rId5">
+            <a:extLst>
+              <a:ext uri="{28A0092B-C50C-407E-A947-70E740481C1C}">
+                <a14:useLocalDpi xmlns:a14="http://schemas.microsoft.com/office/drawing/2010/main" val="0"/>
+              </a:ext>
+            </a:extLst>
+          </a:blip>
+          <a:srcRect/>
+          <a:stretch>
+            <a:fillRect/>
+          </a:stretch>
+        </p:blipFill>
+        <p:spPr bwMode="auto">
+          <a:xfrm>
+            <a:off x="474224" y="6045066"/>
+            <a:ext cx="2028825" cy="428625"/>
+          </a:xfrm>
+          <a:prstGeom prst="rect">
+            <a:avLst/>
+          </a:prstGeom>
+          <a:noFill/>
+          <a:ln>
+            <a:noFill/>
+          </a:ln>
+          <a:extLst>
+            <a:ext uri="{909E8E84-426E-40DD-AFC4-6F175D3DCCD1}">
+              <a14:hiddenFill xmlns:a14="http://schemas.microsoft.com/office/drawing/2010/main">
+                <a:solidFill>
+                  <a:schemeClr val="accent1"/>
+                </a:solidFill>
+              </a14:hiddenFill>
+            </a:ext>
+            <a:ext uri="{91240B29-F687-4F45-9708-019B960494DF}">
+              <a14:hiddenLine xmlns:a14="http://schemas.microsoft.com/office/drawing/2010/main" w="9525">
+                <a:solidFill>
+                  <a:schemeClr val="tx1"/>
+                </a:solidFill>
+                <a:miter lim="800000"/>
+                <a:headEnd/>
+                <a:tailEnd/>
+              </a14:hiddenLine>
+            </a:ext>
+          </a:extLst>
+        </p:spPr>
+      </p:pic>
+    </p:spTree>
+    <p:extLst>
+      <p:ext uri="{BB962C8B-B14F-4D97-AF65-F5344CB8AC3E}">
+        <p14:creationId xmlns:p14="http://schemas.microsoft.com/office/powerpoint/2010/main" val="3928857"/>
+      </p:ext>
+    </p:extLst>
+  </p:cSld>
+  <p:clrMapOvr>
+    <a:masterClrMapping/>
+  </p:clrMapOvr>
+  <p:timing>
+    <p:tnLst>
+      <p:par>
+        <p:cTn id="1" dur="indefinite" restart="never" nodeType="tmRoot"/>
+      </p:par>
+    </p:tnLst>
+  </p:timing>
+</p:sld>
+</file>
+
+<file path=ppt/slides/slide4.xml><?xml version="1.0" encoding="utf-8"?>
+<p:sld xmlns:a="http://schemas.openxmlformats.org/drawingml/2006/main" xmlns:r="http://schemas.openxmlformats.org/officeDocument/2006/relationships" xmlns:p="http://schemas.openxmlformats.org/presentationml/2006/main">
+  <p:cSld>
+    <p:spTree>
+      <p:nvGrpSpPr>
+        <p:cNvPr id="1" name=""/>
+        <p:cNvGrpSpPr/>
+        <p:nvPr/>
+      </p:nvGrpSpPr>
+      <p:grpSpPr>
+        <a:xfrm>
+          <a:off x="0" y="0"/>
+          <a:ext cx="0" cy="0"/>
+          <a:chOff x="0" y="0"/>
+          <a:chExt cx="0" cy="0"/>
+        </a:xfrm>
+      </p:grpSpPr>
+      <p:sp>
+        <p:nvSpPr>
+          <p:cNvPr id="2" name="Titre 1"/>
+          <p:cNvSpPr>
+            <a:spLocks noGrp="1"/>
+          </p:cNvSpPr>
+          <p:nvPr>
+            <p:ph type="title"/>
+          </p:nvPr>
+        </p:nvSpPr>
+        <p:spPr/>
+        <p:txBody>
+          <a:bodyPr>
+            <a:normAutofit fontScale="90000"/>
+          </a:bodyPr>
+          <a:lstStyle/>
+          <a:p>
+            <a:r>
+              <a:rPr lang="fr-FR" dirty="0"/>
+              <a:t>Optimisation des paramètres SVBRDF (ANNEXE B &amp; C)</a:t>
+            </a:r>
+          </a:p>
+        </p:txBody>
+      </p:sp>
+      <p:sp>
+        <p:nvSpPr>
+          <p:cNvPr id="3" name="Espace réservé du contenu 2"/>
+          <p:cNvSpPr>
+            <a:spLocks noGrp="1"/>
+          </p:cNvSpPr>
+          <p:nvPr>
+            <p:ph idx="1"/>
+          </p:nvPr>
+        </p:nvSpPr>
+        <p:spPr/>
+        <p:txBody>
+          <a:bodyPr>
+            <a:normAutofit/>
+          </a:bodyPr>
+          <a:lstStyle/>
+          <a:p>
+            <a:pPr marL="0" indent="0">
+              <a:buNone/>
+            </a:pPr>
+            <a:r>
+              <a:rPr lang="fr-FR" sz="1200" dirty="0" smtClean="0"/>
+              <a:t>Problèmes rencontrés:</a:t>
+            </a:r>
+          </a:p>
+          <a:p>
+            <a:pPr>
+              <a:buFontTx/>
+              <a:buChar char="-"/>
+            </a:pPr>
+            <a:r>
+              <a:rPr lang="fr-FR" sz="1200" dirty="0" smtClean="0"/>
+              <a:t>Qu’est ce qu’il veut dire par « </a:t>
+            </a:r>
+            <a:r>
+              <a:rPr lang="fr-FR" sz="1200" dirty="0" err="1" smtClean="0"/>
+              <a:t>mapping</a:t>
+            </a:r>
+            <a:r>
+              <a:rPr lang="fr-FR" sz="1200" dirty="0" smtClean="0"/>
+              <a:t> to </a:t>
+            </a:r>
+            <a:r>
+              <a:rPr lang="fr-FR" sz="1200" dirty="0" err="1" smtClean="0"/>
+              <a:t>parameters</a:t>
+            </a:r>
+            <a:r>
+              <a:rPr lang="fr-FR" sz="1200" dirty="0" smtClean="0"/>
+              <a:t> »?</a:t>
+            </a:r>
+          </a:p>
+          <a:p>
+            <a:pPr>
+              <a:buFontTx/>
+              <a:buChar char="-"/>
+            </a:pPr>
+            <a:r>
+              <a:rPr lang="fr-FR" sz="1200" dirty="0"/>
+              <a:t>D</a:t>
+            </a:r>
+            <a:r>
+              <a:rPr lang="fr-FR" sz="1200" dirty="0" smtClean="0"/>
+              <a:t>es paramètres sont des vecteurs et non pas de scalaire. Un algorithme de LM a été trouvé dans Efficient Java Matrix Library (EJML) mais elle est pour une fonction 1D et les paramètres sont tous des scalaires. </a:t>
+            </a:r>
+            <a:endParaRPr lang="fr-FR" sz="1400" dirty="0"/>
+          </a:p>
+        </p:txBody>
+      </p:sp>
+      <p:pic>
+        <p:nvPicPr>
+          <p:cNvPr id="2050" name="Picture 2"/>
+          <p:cNvPicPr>
+            <a:picLocks noChangeAspect="1" noChangeArrowheads="1"/>
+          </p:cNvPicPr>
+          <p:nvPr/>
+        </p:nvPicPr>
+        <p:blipFill>
+          <a:blip r:embed="rId2">
+            <a:extLst>
+              <a:ext uri="{28A0092B-C50C-407E-A947-70E740481C1C}">
+                <a14:useLocalDpi xmlns:a14="http://schemas.microsoft.com/office/drawing/2010/main" val="0"/>
+              </a:ext>
+            </a:extLst>
+          </a:blip>
+          <a:srcRect/>
+          <a:stretch>
+            <a:fillRect/>
+          </a:stretch>
+        </p:blipFill>
+        <p:spPr bwMode="auto">
+          <a:xfrm>
+            <a:off x="4211960" y="4750744"/>
+            <a:ext cx="4482058" cy="1905693"/>
+          </a:xfrm>
+          <a:prstGeom prst="rect">
+            <a:avLst/>
+          </a:prstGeom>
+          <a:noFill/>
+          <a:ln>
+            <a:noFill/>
+          </a:ln>
+          <a:extLst>
+            <a:ext uri="{909E8E84-426E-40DD-AFC4-6F175D3DCCD1}">
+              <a14:hiddenFill xmlns:a14="http://schemas.microsoft.com/office/drawing/2010/main">
+                <a:solidFill>
+                  <a:schemeClr val="accent1"/>
+                </a:solidFill>
+              </a14:hiddenFill>
+            </a:ext>
+            <a:ext uri="{91240B29-F687-4F45-9708-019B960494DF}">
+              <a14:hiddenLine xmlns:a14="http://schemas.microsoft.com/office/drawing/2010/main" w="9525">
+                <a:solidFill>
+                  <a:schemeClr val="tx1"/>
+                </a:solidFill>
+                <a:miter lim="800000"/>
+                <a:headEnd/>
+                <a:tailEnd/>
+              </a14:hiddenLine>
+            </a:ext>
+          </a:extLst>
+        </p:spPr>
+      </p:pic>
+      <p:grpSp>
+        <p:nvGrpSpPr>
+          <p:cNvPr id="16" name="Groupe 15"/>
+          <p:cNvGrpSpPr/>
+          <p:nvPr/>
+        </p:nvGrpSpPr>
+        <p:grpSpPr>
+          <a:xfrm>
+            <a:off x="827584" y="3081827"/>
+            <a:ext cx="6624736" cy="1701227"/>
+            <a:chOff x="827584" y="2502235"/>
+            <a:chExt cx="6624736" cy="1701227"/>
+          </a:xfrm>
+        </p:grpSpPr>
+        <p:sp>
+          <p:nvSpPr>
+            <p:cNvPr id="4" name="Rectangle 3"/>
+            <p:cNvSpPr/>
+            <p:nvPr/>
+          </p:nvSpPr>
+          <p:spPr>
+            <a:xfrm>
+              <a:off x="3203848" y="2852936"/>
+              <a:ext cx="1872208" cy="1008112"/>
+            </a:xfrm>
+            <a:prstGeom prst="rect">
+              <a:avLst/>
+            </a:prstGeom>
+          </p:spPr>
+          <p:style>
+            <a:lnRef idx="2">
+              <a:schemeClr val="accent1">
+                <a:shade val="50000"/>
+              </a:schemeClr>
+            </a:lnRef>
+            <a:fillRef idx="1">
+              <a:schemeClr val="accent1"/>
+            </a:fillRef>
+            <a:effectRef idx="0">
+              <a:schemeClr val="accent1"/>
+            </a:effectRef>
+            <a:fontRef idx="minor">
+              <a:schemeClr val="lt1"/>
+            </a:fontRef>
+          </p:style>
+          <p:txBody>
+            <a:bodyPr rtlCol="0" anchor="ctr"/>
+            <a:lstStyle/>
+            <a:p>
+              <a:pPr algn="ctr"/>
+              <a:r>
+                <a:rPr lang="fr-FR" dirty="0" err="1" smtClean="0"/>
+                <a:t>Levenberg-Marquardt</a:t>
+              </a:r>
+              <a:r>
+                <a:rPr lang="fr-FR" dirty="0" smtClean="0"/>
+                <a:t> optimisation</a:t>
+              </a:r>
+              <a:endParaRPr lang="fr-FR" dirty="0"/>
+            </a:p>
+          </p:txBody>
+        </p:sp>
+        <p:cxnSp>
+          <p:nvCxnSpPr>
+            <p:cNvPr id="6" name="Connecteur droit avec flèche 5"/>
+            <p:cNvCxnSpPr/>
+            <p:nvPr/>
+          </p:nvCxnSpPr>
+          <p:spPr>
+            <a:xfrm>
+              <a:off x="2195736" y="2996952"/>
+              <a:ext cx="1008112" cy="0"/>
+            </a:xfrm>
+            <a:prstGeom prst="straightConnector1">
+              <a:avLst/>
+            </a:prstGeom>
+            <a:ln>
+              <a:tailEnd type="arrow"/>
+            </a:ln>
+          </p:spPr>
+          <p:style>
+            <a:lnRef idx="1">
+              <a:schemeClr val="accent1"/>
+            </a:lnRef>
+            <a:fillRef idx="0">
+              <a:schemeClr val="accent1"/>
+            </a:fillRef>
+            <a:effectRef idx="0">
+              <a:schemeClr val="accent1"/>
+            </a:effectRef>
+            <a:fontRef idx="minor">
+              <a:schemeClr val="tx1"/>
+            </a:fontRef>
+          </p:style>
+        </p:cxnSp>
+        <p:sp>
+          <p:nvSpPr>
+            <p:cNvPr id="7" name="Rectangle 6"/>
+            <p:cNvSpPr/>
+            <p:nvPr/>
+          </p:nvSpPr>
+          <p:spPr>
+            <a:xfrm>
+              <a:off x="1187624" y="2708920"/>
+              <a:ext cx="1008112" cy="432048"/>
+            </a:xfrm>
+            <a:prstGeom prst="rect">
+              <a:avLst/>
+            </a:prstGeom>
+          </p:spPr>
+          <p:style>
+            <a:lnRef idx="2">
+              <a:schemeClr val="accent1">
+                <a:shade val="50000"/>
+              </a:schemeClr>
+            </a:lnRef>
+            <a:fillRef idx="1">
+              <a:schemeClr val="accent1"/>
+            </a:fillRef>
+            <a:effectRef idx="0">
+              <a:schemeClr val="accent1"/>
+            </a:effectRef>
+            <a:fontRef idx="minor">
+              <a:schemeClr val="lt1"/>
+            </a:fontRef>
+          </p:style>
+          <p:txBody>
+            <a:bodyPr rtlCol="0" anchor="ctr"/>
+            <a:lstStyle/>
+            <a:p>
+              <a:pPr algn="ctr"/>
+              <a:r>
+                <a:rPr lang="fr-FR" sz="1100" dirty="0" smtClean="0"/>
+                <a:t>Paramètres initial</a:t>
+              </a:r>
+              <a:endParaRPr lang="fr-FR" sz="1100" dirty="0"/>
+            </a:p>
+          </p:txBody>
+        </p:sp>
+        <p:sp>
+          <p:nvSpPr>
+            <p:cNvPr id="9" name="Rectangle 8"/>
+            <p:cNvSpPr/>
+            <p:nvPr/>
+          </p:nvSpPr>
+          <p:spPr>
+            <a:xfrm>
+              <a:off x="827584" y="3280792"/>
+              <a:ext cx="1368152" cy="440432"/>
+            </a:xfrm>
+            <a:prstGeom prst="rect">
+              <a:avLst/>
+            </a:prstGeom>
+          </p:spPr>
+          <p:style>
+            <a:lnRef idx="2">
+              <a:schemeClr val="accent1">
+                <a:shade val="50000"/>
+              </a:schemeClr>
+            </a:lnRef>
+            <a:fillRef idx="1">
+              <a:schemeClr val="accent1"/>
+            </a:fillRef>
+            <a:effectRef idx="0">
+              <a:schemeClr val="accent1"/>
+            </a:effectRef>
+            <a:fontRef idx="minor">
+              <a:schemeClr val="lt1"/>
+            </a:fontRef>
+          </p:style>
+          <p:txBody>
+            <a:bodyPr rtlCol="0" anchor="ctr"/>
+            <a:lstStyle/>
+            <a:p>
+              <a:pPr algn="ctr"/>
+              <a:r>
+                <a:rPr lang="fr-FR" sz="1100" dirty="0" smtClean="0"/>
+                <a:t>BRDF sur chaque pixel</a:t>
+              </a:r>
+              <a:endParaRPr lang="fr-FR" sz="1100" dirty="0"/>
+            </a:p>
+          </p:txBody>
+        </p:sp>
+        <p:cxnSp>
+          <p:nvCxnSpPr>
+            <p:cNvPr id="10" name="Connecteur droit avec flèche 9"/>
+            <p:cNvCxnSpPr/>
+            <p:nvPr/>
+          </p:nvCxnSpPr>
+          <p:spPr>
+            <a:xfrm>
+              <a:off x="2195736" y="3501008"/>
+              <a:ext cx="1008112" cy="0"/>
+            </a:xfrm>
+            <a:prstGeom prst="straightConnector1">
+              <a:avLst/>
+            </a:prstGeom>
+            <a:ln>
+              <a:tailEnd type="arrow"/>
+            </a:ln>
+          </p:spPr>
+          <p:style>
+            <a:lnRef idx="1">
+              <a:schemeClr val="accent1"/>
+            </a:lnRef>
+            <a:fillRef idx="0">
+              <a:schemeClr val="accent1"/>
+            </a:fillRef>
+            <a:effectRef idx="0">
+              <a:schemeClr val="accent1"/>
+            </a:effectRef>
+            <a:fontRef idx="minor">
+              <a:schemeClr val="tx1"/>
+            </a:fontRef>
+          </p:style>
+        </p:cxnSp>
+        <p:sp>
+          <p:nvSpPr>
+            <p:cNvPr id="11" name="Rectangle 10"/>
+            <p:cNvSpPr/>
+            <p:nvPr/>
+          </p:nvSpPr>
+          <p:spPr>
+            <a:xfrm>
+              <a:off x="846813" y="3826654"/>
+              <a:ext cx="1368152" cy="376808"/>
+            </a:xfrm>
+            <a:prstGeom prst="rect">
+              <a:avLst/>
+            </a:prstGeom>
+          </p:spPr>
+          <p:style>
+            <a:lnRef idx="2">
+              <a:schemeClr val="accent1">
+                <a:shade val="50000"/>
+              </a:schemeClr>
+            </a:lnRef>
+            <a:fillRef idx="1">
+              <a:schemeClr val="accent1"/>
+            </a:fillRef>
+            <a:effectRef idx="0">
+              <a:schemeClr val="accent1"/>
+            </a:effectRef>
+            <a:fontRef idx="minor">
+              <a:schemeClr val="lt1"/>
+            </a:fontRef>
+          </p:style>
+          <p:txBody>
+            <a:bodyPr rtlCol="0" anchor="ctr"/>
+            <a:lstStyle/>
+            <a:p>
+              <a:pPr algn="ctr"/>
+              <a:r>
+                <a:rPr lang="fr-FR" sz="1100" dirty="0" smtClean="0"/>
+                <a:t>Position de chaque pixel p</a:t>
+              </a:r>
+              <a:endParaRPr lang="fr-FR" sz="1100" dirty="0"/>
+            </a:p>
+          </p:txBody>
+        </p:sp>
+        <p:cxnSp>
+          <p:nvCxnSpPr>
+            <p:cNvPr id="12" name="Connecteur droit avec flèche 11"/>
+            <p:cNvCxnSpPr/>
+            <p:nvPr/>
+          </p:nvCxnSpPr>
+          <p:spPr>
+            <a:xfrm>
+              <a:off x="2214965" y="3861048"/>
+              <a:ext cx="1008112" cy="0"/>
+            </a:xfrm>
+            <a:prstGeom prst="straightConnector1">
+              <a:avLst/>
+            </a:prstGeom>
+            <a:ln>
+              <a:tailEnd type="arrow"/>
+            </a:ln>
+          </p:spPr>
+          <p:style>
+            <a:lnRef idx="1">
+              <a:schemeClr val="accent1"/>
+            </a:lnRef>
+            <a:fillRef idx="0">
+              <a:schemeClr val="accent1"/>
+            </a:fillRef>
+            <a:effectRef idx="0">
+              <a:schemeClr val="accent1"/>
+            </a:effectRef>
+            <a:fontRef idx="minor">
+              <a:schemeClr val="tx1"/>
+            </a:fontRef>
+          </p:style>
+        </p:cxnSp>
+        <p:cxnSp>
+          <p:nvCxnSpPr>
+            <p:cNvPr id="13" name="Connecteur droit avec flèche 12"/>
+            <p:cNvCxnSpPr/>
+            <p:nvPr/>
+          </p:nvCxnSpPr>
+          <p:spPr>
+            <a:xfrm>
+              <a:off x="5076056" y="3356992"/>
+              <a:ext cx="1008112" cy="0"/>
+            </a:xfrm>
+            <a:prstGeom prst="straightConnector1">
+              <a:avLst/>
+            </a:prstGeom>
+            <a:ln>
+              <a:tailEnd type="arrow"/>
+            </a:ln>
+          </p:spPr>
+          <p:style>
+            <a:lnRef idx="1">
+              <a:schemeClr val="accent1"/>
+            </a:lnRef>
+            <a:fillRef idx="0">
+              <a:schemeClr val="accent1"/>
+            </a:fillRef>
+            <a:effectRef idx="0">
+              <a:schemeClr val="accent1"/>
+            </a:effectRef>
+            <a:fontRef idx="minor">
+              <a:schemeClr val="tx1"/>
+            </a:fontRef>
+          </p:style>
+        </p:cxnSp>
+        <p:sp>
+          <p:nvSpPr>
+            <p:cNvPr id="14" name="Rectangle 13"/>
+            <p:cNvSpPr/>
+            <p:nvPr/>
+          </p:nvSpPr>
+          <p:spPr>
+            <a:xfrm>
+              <a:off x="6084168" y="3202213"/>
+              <a:ext cx="1368152" cy="440432"/>
+            </a:xfrm>
+            <a:prstGeom prst="rect">
+              <a:avLst/>
+            </a:prstGeom>
+          </p:spPr>
+          <p:style>
+            <a:lnRef idx="2">
+              <a:schemeClr val="accent1">
+                <a:shade val="50000"/>
+              </a:schemeClr>
+            </a:lnRef>
+            <a:fillRef idx="1">
+              <a:schemeClr val="accent1"/>
+            </a:fillRef>
+            <a:effectRef idx="0">
+              <a:schemeClr val="accent1"/>
+            </a:effectRef>
+            <a:fontRef idx="minor">
+              <a:schemeClr val="lt1"/>
+            </a:fontRef>
+          </p:style>
+          <p:txBody>
+            <a:bodyPr rtlCol="0" anchor="ctr"/>
+            <a:lstStyle/>
+            <a:p>
+              <a:pPr algn="ctr"/>
+              <a:r>
+                <a:rPr lang="fr-FR" sz="1100" dirty="0" smtClean="0"/>
+                <a:t>BRDF sur chaque pixel ajusté</a:t>
+              </a:r>
+              <a:endParaRPr lang="fr-FR" sz="1100" dirty="0"/>
+            </a:p>
+          </p:txBody>
+        </p:sp>
+        <p:sp>
+          <p:nvSpPr>
+            <p:cNvPr id="15" name="Multiplier 14"/>
+            <p:cNvSpPr/>
+            <p:nvPr/>
+          </p:nvSpPr>
+          <p:spPr>
+            <a:xfrm>
+              <a:off x="1079612" y="2502235"/>
+              <a:ext cx="216024" cy="220216"/>
+            </a:xfrm>
+            <a:prstGeom prst="mathMultiply">
+              <a:avLst/>
+            </a:prstGeom>
+            <a:solidFill>
+              <a:schemeClr val="tx2"/>
+            </a:solidFill>
+          </p:spPr>
+          <p:style>
+            <a:lnRef idx="2">
+              <a:schemeClr val="accent1">
+                <a:shade val="50000"/>
+              </a:schemeClr>
+            </a:lnRef>
+            <a:fillRef idx="1">
+              <a:schemeClr val="accent1"/>
+            </a:fillRef>
+            <a:effectRef idx="0">
+              <a:schemeClr val="accent1"/>
+            </a:effectRef>
+            <a:fontRef idx="minor">
+              <a:schemeClr val="lt1"/>
+            </a:fontRef>
+          </p:style>
+          <p:txBody>
+            <a:bodyPr rtlCol="0" anchor="ctr"/>
+            <a:lstStyle/>
+            <a:p>
+              <a:pPr algn="ctr"/>
+              <a:endParaRPr lang="fr-FR"/>
+            </a:p>
+          </p:txBody>
+        </p:sp>
+      </p:grpSp>
+      <p:sp>
+        <p:nvSpPr>
+          <p:cNvPr id="17" name="Multiplier 16"/>
+          <p:cNvSpPr/>
+          <p:nvPr/>
+        </p:nvSpPr>
+        <p:spPr>
+          <a:xfrm>
+            <a:off x="3707904" y="4437112"/>
+            <a:ext cx="216024" cy="220216"/>
+          </a:xfrm>
+          <a:prstGeom prst="mathMultiply">
+            <a:avLst/>
+          </a:prstGeom>
+          <a:solidFill>
+            <a:schemeClr val="tx2"/>
+          </a:solidFill>
+        </p:spPr>
+        <p:style>
+          <a:lnRef idx="2">
+            <a:schemeClr val="accent1">
+              <a:shade val="50000"/>
+            </a:schemeClr>
+          </a:lnRef>
+          <a:fillRef idx="1">
+            <a:schemeClr val="accent1"/>
+          </a:fillRef>
+          <a:effectRef idx="0">
+            <a:schemeClr val="accent1"/>
+          </a:effectRef>
+          <a:fontRef idx="minor">
+            <a:schemeClr val="lt1"/>
+          </a:fontRef>
+        </p:style>
+        <p:txBody>
+          <a:bodyPr rtlCol="0" anchor="ctr"/>
+          <a:lstStyle/>
+          <a:p>
+            <a:pPr algn="ctr"/>
+            <a:endParaRPr lang="fr-FR"/>
+          </a:p>
+        </p:txBody>
+      </p:sp>
+    </p:spTree>
+    <p:extLst>
+      <p:ext uri="{BB962C8B-B14F-4D97-AF65-F5344CB8AC3E}">
+        <p14:creationId xmlns:p14="http://schemas.microsoft.com/office/powerpoint/2010/main" val="201587931"/>
       </p:ext>
     </p:extLst>
   </p:cSld>

</xml_diff>

<commit_message>
+ update slide ppt
</commit_message>
<xml_diff>
--- a/Slide/discussion.pptx
+++ b/Slide/discussion.pptx
@@ -9,6 +9,7 @@
     <p:sldId id="258" r:id="rId3"/>
     <p:sldId id="259" r:id="rId4"/>
     <p:sldId id="260" r:id="rId5"/>
+    <p:sldId id="261" r:id="rId6"/>
   </p:sldIdLst>
   <p:sldSz cx="9144000" cy="6858000" type="screen4x3"/>
   <p:notesSz cx="6858000" cy="9144000"/>
@@ -298,7 +299,7 @@
           <a:p>
             <a:fld id="{07BE1092-F7C4-4CFF-A7EF-99DF9CEB52D3}" type="datetimeFigureOut">
               <a:rPr lang="fr-FR" smtClean="0"/>
-              <a:t>23/03/2016</a:t>
+              <a:t>24/03/2016</a:t>
             </a:fld>
             <a:endParaRPr lang="fr-FR"/>
           </a:p>
@@ -498,7 +499,7 @@
           <a:p>
             <a:fld id="{07BE1092-F7C4-4CFF-A7EF-99DF9CEB52D3}" type="datetimeFigureOut">
               <a:rPr lang="fr-FR" smtClean="0"/>
-              <a:t>23/03/2016</a:t>
+              <a:t>24/03/2016</a:t>
             </a:fld>
             <a:endParaRPr lang="fr-FR"/>
           </a:p>
@@ -673,7 +674,7 @@
           <a:p>
             <a:fld id="{07BE1092-F7C4-4CFF-A7EF-99DF9CEB52D3}" type="datetimeFigureOut">
               <a:rPr lang="fr-FR" smtClean="0"/>
-              <a:t>23/03/2016</a:t>
+              <a:t>24/03/2016</a:t>
             </a:fld>
             <a:endParaRPr lang="fr-FR"/>
           </a:p>
@@ -838,7 +839,7 @@
           <a:p>
             <a:fld id="{07BE1092-F7C4-4CFF-A7EF-99DF9CEB52D3}" type="datetimeFigureOut">
               <a:rPr lang="fr-FR" smtClean="0"/>
-              <a:t>23/03/2016</a:t>
+              <a:t>24/03/2016</a:t>
             </a:fld>
             <a:endParaRPr lang="fr-FR"/>
           </a:p>
@@ -1086,7 +1087,7 @@
           <a:p>
             <a:fld id="{07BE1092-F7C4-4CFF-A7EF-99DF9CEB52D3}" type="datetimeFigureOut">
               <a:rPr lang="fr-FR" smtClean="0"/>
-              <a:t>23/03/2016</a:t>
+              <a:t>24/03/2016</a:t>
             </a:fld>
             <a:endParaRPr lang="fr-FR"/>
           </a:p>
@@ -1404,7 +1405,7 @@
           <a:p>
             <a:fld id="{07BE1092-F7C4-4CFF-A7EF-99DF9CEB52D3}" type="datetimeFigureOut">
               <a:rPr lang="fr-FR" smtClean="0"/>
-              <a:t>23/03/2016</a:t>
+              <a:t>24/03/2016</a:t>
             </a:fld>
             <a:endParaRPr lang="fr-FR"/>
           </a:p>
@@ -1870,7 +1871,7 @@
           <a:p>
             <a:fld id="{07BE1092-F7C4-4CFF-A7EF-99DF9CEB52D3}" type="datetimeFigureOut">
               <a:rPr lang="fr-FR" smtClean="0"/>
-              <a:t>23/03/2016</a:t>
+              <a:t>24/03/2016</a:t>
             </a:fld>
             <a:endParaRPr lang="fr-FR"/>
           </a:p>
@@ -2018,7 +2019,7 @@
           <a:p>
             <a:fld id="{07BE1092-F7C4-4CFF-A7EF-99DF9CEB52D3}" type="datetimeFigureOut">
               <a:rPr lang="fr-FR" smtClean="0"/>
-              <a:t>23/03/2016</a:t>
+              <a:t>24/03/2016</a:t>
             </a:fld>
             <a:endParaRPr lang="fr-FR"/>
           </a:p>
@@ -2108,7 +2109,7 @@
           <a:p>
             <a:fld id="{07BE1092-F7C4-4CFF-A7EF-99DF9CEB52D3}" type="datetimeFigureOut">
               <a:rPr lang="fr-FR" smtClean="0"/>
-              <a:t>23/03/2016</a:t>
+              <a:t>24/03/2016</a:t>
             </a:fld>
             <a:endParaRPr lang="fr-FR"/>
           </a:p>
@@ -2382,7 +2383,7 @@
           <a:p>
             <a:fld id="{07BE1092-F7C4-4CFF-A7EF-99DF9CEB52D3}" type="datetimeFigureOut">
               <a:rPr lang="fr-FR" smtClean="0"/>
-              <a:t>23/03/2016</a:t>
+              <a:t>24/03/2016</a:t>
             </a:fld>
             <a:endParaRPr lang="fr-FR"/>
           </a:p>
@@ -2687,7 +2688,7 @@
           <a:p>
             <a:fld id="{07BE1092-F7C4-4CFF-A7EF-99DF9CEB52D3}" type="datetimeFigureOut">
               <a:rPr lang="fr-FR" smtClean="0"/>
-              <a:t>23/03/2016</a:t>
+              <a:t>24/03/2016</a:t>
             </a:fld>
             <a:endParaRPr lang="fr-FR"/>
           </a:p>
@@ -2985,7 +2986,7 @@
           <a:p>
             <a:fld id="{07BE1092-F7C4-4CFF-A7EF-99DF9CEB52D3}" type="datetimeFigureOut">
               <a:rPr lang="fr-FR" smtClean="0"/>
-              <a:t>23/03/2016</a:t>
+              <a:t>24/03/2016</a:t>
             </a:fld>
             <a:endParaRPr lang="fr-FR"/>
           </a:p>
@@ -4810,11 +4811,7 @@
           <a:p>
             <a:r>
               <a:rPr lang="fr-FR" dirty="0" smtClean="0"/>
-              <a:t>Optimisation des paramètres SVBRDF (ANNEXE </a:t>
-            </a:r>
-            <a:r>
-              <a:rPr lang="fr-FR" dirty="0" smtClean="0"/>
-              <a:t>B &amp; C)</a:t>
+              <a:t>Optimisation des paramètres SVBRDF (ANNEXE B &amp; C)</a:t>
             </a:r>
             <a:endParaRPr lang="fr-FR" dirty="0"/>
           </a:p>
@@ -6230,7 +6227,7 @@
         </p:nvSpPr>
         <p:spPr>
           <a:xfrm>
-            <a:off x="3707904" y="4437112"/>
+            <a:off x="4355976" y="4750744"/>
             <a:ext cx="216024" cy="220216"/>
           </a:xfrm>
           <a:prstGeom prst="mathMultiply">
@@ -6265,10 +6262,1400 @@
           </a:p>
         </p:txBody>
       </p:sp>
+      <p:sp>
+        <p:nvSpPr>
+          <p:cNvPr id="18" name="Multiplier 17"/>
+          <p:cNvSpPr/>
+          <p:nvPr/>
+        </p:nvSpPr>
+        <p:spPr>
+          <a:xfrm>
+            <a:off x="719572" y="3697852"/>
+            <a:ext cx="216024" cy="220216"/>
+          </a:xfrm>
+          <a:prstGeom prst="mathMultiply">
+            <a:avLst/>
+          </a:prstGeom>
+          <a:solidFill>
+            <a:schemeClr val="tx2"/>
+          </a:solidFill>
+        </p:spPr>
+        <p:style>
+          <a:lnRef idx="2">
+            <a:schemeClr val="accent1">
+              <a:shade val="50000"/>
+            </a:schemeClr>
+          </a:lnRef>
+          <a:fillRef idx="1">
+            <a:schemeClr val="accent1"/>
+          </a:fillRef>
+          <a:effectRef idx="0">
+            <a:schemeClr val="accent1"/>
+          </a:effectRef>
+          <a:fontRef idx="minor">
+            <a:schemeClr val="lt1"/>
+          </a:fontRef>
+        </p:style>
+        <p:txBody>
+          <a:bodyPr rtlCol="0" anchor="ctr"/>
+          <a:lstStyle/>
+          <a:p>
+            <a:pPr algn="ctr"/>
+            <a:endParaRPr lang="fr-FR"/>
+          </a:p>
+        </p:txBody>
+      </p:sp>
+      <p:sp>
+        <p:nvSpPr>
+          <p:cNvPr id="19" name="Multiplier 18"/>
+          <p:cNvSpPr/>
+          <p:nvPr/>
+        </p:nvSpPr>
+        <p:spPr>
+          <a:xfrm>
+            <a:off x="863588" y="3685114"/>
+            <a:ext cx="216024" cy="220216"/>
+          </a:xfrm>
+          <a:prstGeom prst="mathMultiply">
+            <a:avLst/>
+          </a:prstGeom>
+          <a:solidFill>
+            <a:schemeClr val="tx2"/>
+          </a:solidFill>
+        </p:spPr>
+        <p:style>
+          <a:lnRef idx="2">
+            <a:schemeClr val="accent1">
+              <a:shade val="50000"/>
+            </a:schemeClr>
+          </a:lnRef>
+          <a:fillRef idx="1">
+            <a:schemeClr val="accent1"/>
+          </a:fillRef>
+          <a:effectRef idx="0">
+            <a:schemeClr val="accent1"/>
+          </a:effectRef>
+          <a:fontRef idx="minor">
+            <a:schemeClr val="lt1"/>
+          </a:fontRef>
+        </p:style>
+        <p:txBody>
+          <a:bodyPr rtlCol="0" anchor="ctr"/>
+          <a:lstStyle/>
+          <a:p>
+            <a:pPr algn="ctr"/>
+            <a:endParaRPr lang="fr-FR"/>
+          </a:p>
+        </p:txBody>
+      </p:sp>
     </p:spTree>
     <p:extLst>
       <p:ext uri="{BB962C8B-B14F-4D97-AF65-F5344CB8AC3E}">
         <p14:creationId xmlns:p14="http://schemas.microsoft.com/office/powerpoint/2010/main" val="201587931"/>
+      </p:ext>
+    </p:extLst>
+  </p:cSld>
+  <p:clrMapOvr>
+    <a:masterClrMapping/>
+  </p:clrMapOvr>
+  <p:timing>
+    <p:tnLst>
+      <p:par>
+        <p:cTn id="1" dur="indefinite" restart="never" nodeType="tmRoot"/>
+      </p:par>
+    </p:tnLst>
+  </p:timing>
+</p:sld>
+</file>
+
+<file path=ppt/slides/slide5.xml><?xml version="1.0" encoding="utf-8"?>
+<p:sld xmlns:a="http://schemas.openxmlformats.org/drawingml/2006/main" xmlns:r="http://schemas.openxmlformats.org/officeDocument/2006/relationships" xmlns:p="http://schemas.openxmlformats.org/presentationml/2006/main">
+  <p:cSld>
+    <p:spTree>
+      <p:nvGrpSpPr>
+        <p:cNvPr id="1" name=""/>
+        <p:cNvGrpSpPr/>
+        <p:nvPr/>
+      </p:nvGrpSpPr>
+      <p:grpSpPr>
+        <a:xfrm>
+          <a:off x="0" y="0"/>
+          <a:ext cx="0" cy="0"/>
+          <a:chOff x="0" y="0"/>
+          <a:chExt cx="0" cy="0"/>
+        </a:xfrm>
+      </p:grpSpPr>
+      <p:sp>
+        <p:nvSpPr>
+          <p:cNvPr id="2" name="Titre 1"/>
+          <p:cNvSpPr>
+            <a:spLocks noGrp="1"/>
+          </p:cNvSpPr>
+          <p:nvPr>
+            <p:ph type="title"/>
+          </p:nvPr>
+        </p:nvSpPr>
+        <p:spPr/>
+        <p:txBody>
+          <a:bodyPr>
+            <a:normAutofit fontScale="90000"/>
+          </a:bodyPr>
+          <a:lstStyle/>
+          <a:p>
+            <a:r>
+              <a:rPr lang="fr-FR" dirty="0"/>
+              <a:t>Optimisation des paramètres SVBRDF (ANNEXE B &amp; C)</a:t>
+            </a:r>
+          </a:p>
+        </p:txBody>
+      </p:sp>
+      <p:sp>
+        <p:nvSpPr>
+          <p:cNvPr id="3" name="Espace réservé du contenu 2"/>
+          <p:cNvSpPr>
+            <a:spLocks noGrp="1"/>
+          </p:cNvSpPr>
+          <p:nvPr>
+            <p:ph idx="1"/>
+          </p:nvPr>
+        </p:nvSpPr>
+        <p:spPr/>
+        <p:txBody>
+          <a:bodyPr/>
+          <a:lstStyle/>
+          <a:p>
+            <a:endParaRPr lang="fr-FR" dirty="0"/>
+          </a:p>
+        </p:txBody>
+      </p:sp>
+      <p:sp>
+        <p:nvSpPr>
+          <p:cNvPr id="5" name="Multiplier 4"/>
+          <p:cNvSpPr/>
+          <p:nvPr/>
+        </p:nvSpPr>
+        <p:spPr>
+          <a:xfrm>
+            <a:off x="755576" y="2132856"/>
+            <a:ext cx="216024" cy="220216"/>
+          </a:xfrm>
+          <a:prstGeom prst="mathMultiply">
+            <a:avLst/>
+          </a:prstGeom>
+          <a:solidFill>
+            <a:schemeClr val="tx2"/>
+          </a:solidFill>
+        </p:spPr>
+        <p:style>
+          <a:lnRef idx="2">
+            <a:schemeClr val="accent1">
+              <a:shade val="50000"/>
+            </a:schemeClr>
+          </a:lnRef>
+          <a:fillRef idx="1">
+            <a:schemeClr val="accent1"/>
+          </a:fillRef>
+          <a:effectRef idx="0">
+            <a:schemeClr val="accent1"/>
+          </a:effectRef>
+          <a:fontRef idx="minor">
+            <a:schemeClr val="lt1"/>
+          </a:fontRef>
+        </p:style>
+        <p:txBody>
+          <a:bodyPr rtlCol="0" anchor="ctr"/>
+          <a:lstStyle/>
+          <a:p>
+            <a:pPr algn="ctr"/>
+            <a:endParaRPr lang="fr-FR"/>
+          </a:p>
+        </p:txBody>
+      </p:sp>
+      <p:sp>
+        <p:nvSpPr>
+          <p:cNvPr id="6" name="Multiplier 5"/>
+          <p:cNvSpPr/>
+          <p:nvPr/>
+        </p:nvSpPr>
+        <p:spPr>
+          <a:xfrm>
+            <a:off x="971600" y="2132856"/>
+            <a:ext cx="216024" cy="220216"/>
+          </a:xfrm>
+          <a:prstGeom prst="mathMultiply">
+            <a:avLst/>
+          </a:prstGeom>
+          <a:solidFill>
+            <a:schemeClr val="tx2"/>
+          </a:solidFill>
+        </p:spPr>
+        <p:style>
+          <a:lnRef idx="2">
+            <a:schemeClr val="accent1">
+              <a:shade val="50000"/>
+            </a:schemeClr>
+          </a:lnRef>
+          <a:fillRef idx="1">
+            <a:schemeClr val="accent1"/>
+          </a:fillRef>
+          <a:effectRef idx="0">
+            <a:schemeClr val="accent1"/>
+          </a:effectRef>
+          <a:fontRef idx="minor">
+            <a:schemeClr val="lt1"/>
+          </a:fontRef>
+        </p:style>
+        <p:txBody>
+          <a:bodyPr rtlCol="0" anchor="ctr"/>
+          <a:lstStyle/>
+          <a:p>
+            <a:pPr algn="ctr"/>
+            <a:endParaRPr lang="fr-FR"/>
+          </a:p>
+        </p:txBody>
+      </p:sp>
+      <p:sp>
+        <p:nvSpPr>
+          <p:cNvPr id="7" name="Rectangle 6"/>
+          <p:cNvSpPr/>
+          <p:nvPr/>
+        </p:nvSpPr>
+        <p:spPr>
+          <a:xfrm>
+            <a:off x="1079612" y="2353072"/>
+            <a:ext cx="1476164" cy="1363960"/>
+          </a:xfrm>
+          <a:prstGeom prst="rect">
+            <a:avLst/>
+          </a:prstGeom>
+        </p:spPr>
+        <p:style>
+          <a:lnRef idx="2">
+            <a:schemeClr val="accent1">
+              <a:shade val="50000"/>
+            </a:schemeClr>
+          </a:lnRef>
+          <a:fillRef idx="1">
+            <a:schemeClr val="accent1"/>
+          </a:fillRef>
+          <a:effectRef idx="0">
+            <a:schemeClr val="accent1"/>
+          </a:effectRef>
+          <a:fontRef idx="minor">
+            <a:schemeClr val="lt1"/>
+          </a:fontRef>
+        </p:style>
+        <p:txBody>
+          <a:bodyPr rtlCol="0" anchor="ctr"/>
+          <a:lstStyle/>
+          <a:p>
+            <a:pPr algn="ctr"/>
+            <a:endParaRPr lang="fr-FR" dirty="0"/>
+          </a:p>
+        </p:txBody>
+      </p:sp>
+      <p:sp>
+        <p:nvSpPr>
+          <p:cNvPr id="8" name="Rectangle 7"/>
+          <p:cNvSpPr/>
+          <p:nvPr/>
+        </p:nvSpPr>
+        <p:spPr>
+          <a:xfrm>
+            <a:off x="2733280" y="2353072"/>
+            <a:ext cx="1476164" cy="1363960"/>
+          </a:xfrm>
+          <a:prstGeom prst="rect">
+            <a:avLst/>
+          </a:prstGeom>
+        </p:spPr>
+        <p:style>
+          <a:lnRef idx="2">
+            <a:schemeClr val="accent1">
+              <a:shade val="50000"/>
+            </a:schemeClr>
+          </a:lnRef>
+          <a:fillRef idx="1">
+            <a:schemeClr val="accent1"/>
+          </a:fillRef>
+          <a:effectRef idx="0">
+            <a:schemeClr val="accent1"/>
+          </a:effectRef>
+          <a:fontRef idx="minor">
+            <a:schemeClr val="lt1"/>
+          </a:fontRef>
+        </p:style>
+        <p:txBody>
+          <a:bodyPr rtlCol="0" anchor="ctr"/>
+          <a:lstStyle/>
+          <a:p>
+            <a:pPr algn="ctr"/>
+            <a:endParaRPr lang="fr-FR" dirty="0"/>
+          </a:p>
+        </p:txBody>
+      </p:sp>
+      <p:sp>
+        <p:nvSpPr>
+          <p:cNvPr id="9" name="Rectangle 8"/>
+          <p:cNvSpPr/>
+          <p:nvPr/>
+        </p:nvSpPr>
+        <p:spPr>
+          <a:xfrm>
+            <a:off x="5364088" y="2353072"/>
+            <a:ext cx="1476164" cy="1363960"/>
+          </a:xfrm>
+          <a:prstGeom prst="rect">
+            <a:avLst/>
+          </a:prstGeom>
+        </p:spPr>
+        <p:style>
+          <a:lnRef idx="2">
+            <a:schemeClr val="accent1">
+              <a:shade val="50000"/>
+            </a:schemeClr>
+          </a:lnRef>
+          <a:fillRef idx="1">
+            <a:schemeClr val="accent1"/>
+          </a:fillRef>
+          <a:effectRef idx="0">
+            <a:schemeClr val="accent1"/>
+          </a:effectRef>
+          <a:fontRef idx="minor">
+            <a:schemeClr val="lt1"/>
+          </a:fontRef>
+        </p:style>
+        <p:txBody>
+          <a:bodyPr rtlCol="0" anchor="ctr"/>
+          <a:lstStyle/>
+          <a:p>
+            <a:pPr algn="ctr"/>
+            <a:endParaRPr lang="fr-FR" dirty="0"/>
+          </a:p>
+        </p:txBody>
+      </p:sp>
+      <p:sp>
+        <p:nvSpPr>
+          <p:cNvPr id="10" name="Rectangle 9"/>
+          <p:cNvSpPr/>
+          <p:nvPr/>
+        </p:nvSpPr>
+        <p:spPr>
+          <a:xfrm>
+            <a:off x="1075627" y="4293096"/>
+            <a:ext cx="1476164" cy="1363960"/>
+          </a:xfrm>
+          <a:prstGeom prst="rect">
+            <a:avLst/>
+          </a:prstGeom>
+        </p:spPr>
+        <p:style>
+          <a:lnRef idx="2">
+            <a:schemeClr val="accent1">
+              <a:shade val="50000"/>
+            </a:schemeClr>
+          </a:lnRef>
+          <a:fillRef idx="1">
+            <a:schemeClr val="accent1"/>
+          </a:fillRef>
+          <a:effectRef idx="0">
+            <a:schemeClr val="accent1"/>
+          </a:effectRef>
+          <a:fontRef idx="minor">
+            <a:schemeClr val="lt1"/>
+          </a:fontRef>
+        </p:style>
+        <p:txBody>
+          <a:bodyPr rtlCol="0" anchor="ctr"/>
+          <a:lstStyle/>
+          <a:p>
+            <a:pPr algn="ctr"/>
+            <a:endParaRPr lang="fr-FR" dirty="0"/>
+          </a:p>
+        </p:txBody>
+      </p:sp>
+      <p:sp>
+        <p:nvSpPr>
+          <p:cNvPr id="11" name="Rectangle 10"/>
+          <p:cNvSpPr/>
+          <p:nvPr/>
+        </p:nvSpPr>
+        <p:spPr>
+          <a:xfrm>
+            <a:off x="5364817" y="4300929"/>
+            <a:ext cx="1476164" cy="1363960"/>
+          </a:xfrm>
+          <a:prstGeom prst="rect">
+            <a:avLst/>
+          </a:prstGeom>
+        </p:spPr>
+        <p:style>
+          <a:lnRef idx="2">
+            <a:schemeClr val="accent1">
+              <a:shade val="50000"/>
+            </a:schemeClr>
+          </a:lnRef>
+          <a:fillRef idx="1">
+            <a:schemeClr val="accent1"/>
+          </a:fillRef>
+          <a:effectRef idx="0">
+            <a:schemeClr val="accent1"/>
+          </a:effectRef>
+          <a:fontRef idx="minor">
+            <a:schemeClr val="lt1"/>
+          </a:fontRef>
+        </p:style>
+        <p:txBody>
+          <a:bodyPr rtlCol="0" anchor="ctr"/>
+          <a:lstStyle/>
+          <a:p>
+            <a:pPr algn="ctr"/>
+            <a:endParaRPr lang="fr-FR" dirty="0"/>
+          </a:p>
+        </p:txBody>
+      </p:sp>
+      <p:sp>
+        <p:nvSpPr>
+          <p:cNvPr id="12" name="Rectangle 11"/>
+          <p:cNvSpPr/>
+          <p:nvPr/>
+        </p:nvSpPr>
+        <p:spPr>
+          <a:xfrm>
+            <a:off x="2780037" y="4293096"/>
+            <a:ext cx="1476164" cy="1363960"/>
+          </a:xfrm>
+          <a:prstGeom prst="rect">
+            <a:avLst/>
+          </a:prstGeom>
+        </p:spPr>
+        <p:style>
+          <a:lnRef idx="2">
+            <a:schemeClr val="accent1">
+              <a:shade val="50000"/>
+            </a:schemeClr>
+          </a:lnRef>
+          <a:fillRef idx="1">
+            <a:schemeClr val="accent1"/>
+          </a:fillRef>
+          <a:effectRef idx="0">
+            <a:schemeClr val="accent1"/>
+          </a:effectRef>
+          <a:fontRef idx="minor">
+            <a:schemeClr val="lt1"/>
+          </a:fontRef>
+        </p:style>
+        <p:txBody>
+          <a:bodyPr rtlCol="0" anchor="ctr"/>
+          <a:lstStyle/>
+          <a:p>
+            <a:pPr algn="ctr"/>
+            <a:endParaRPr lang="fr-FR" dirty="0"/>
+          </a:p>
+        </p:txBody>
+      </p:sp>
+      <p:sp>
+        <p:nvSpPr>
+          <p:cNvPr id="13" name="Organigramme : Connecteur 12"/>
+          <p:cNvSpPr/>
+          <p:nvPr/>
+        </p:nvSpPr>
+        <p:spPr>
+          <a:xfrm>
+            <a:off x="4411721" y="2963044"/>
+            <a:ext cx="171783" cy="144016"/>
+          </a:xfrm>
+          <a:prstGeom prst="flowChartConnector">
+            <a:avLst/>
+          </a:prstGeom>
+        </p:spPr>
+        <p:style>
+          <a:lnRef idx="2">
+            <a:schemeClr val="accent1">
+              <a:shade val="50000"/>
+            </a:schemeClr>
+          </a:lnRef>
+          <a:fillRef idx="1">
+            <a:schemeClr val="accent1"/>
+          </a:fillRef>
+          <a:effectRef idx="0">
+            <a:schemeClr val="accent1"/>
+          </a:effectRef>
+          <a:fontRef idx="minor">
+            <a:schemeClr val="lt1"/>
+          </a:fontRef>
+        </p:style>
+        <p:txBody>
+          <a:bodyPr rtlCol="0" anchor="ctr"/>
+          <a:lstStyle/>
+          <a:p>
+            <a:pPr algn="ctr"/>
+            <a:endParaRPr lang="fr-FR"/>
+          </a:p>
+        </p:txBody>
+      </p:sp>
+      <p:sp>
+        <p:nvSpPr>
+          <p:cNvPr id="14" name="Organigramme : Connecteur 13"/>
+          <p:cNvSpPr/>
+          <p:nvPr/>
+        </p:nvSpPr>
+        <p:spPr>
+          <a:xfrm>
+            <a:off x="4650012" y="2971428"/>
+            <a:ext cx="171783" cy="144016"/>
+          </a:xfrm>
+          <a:prstGeom prst="flowChartConnector">
+            <a:avLst/>
+          </a:prstGeom>
+        </p:spPr>
+        <p:style>
+          <a:lnRef idx="2">
+            <a:schemeClr val="accent1">
+              <a:shade val="50000"/>
+            </a:schemeClr>
+          </a:lnRef>
+          <a:fillRef idx="1">
+            <a:schemeClr val="accent1"/>
+          </a:fillRef>
+          <a:effectRef idx="0">
+            <a:schemeClr val="accent1"/>
+          </a:effectRef>
+          <a:fontRef idx="minor">
+            <a:schemeClr val="lt1"/>
+          </a:fontRef>
+        </p:style>
+        <p:txBody>
+          <a:bodyPr rtlCol="0" anchor="ctr"/>
+          <a:lstStyle/>
+          <a:p>
+            <a:pPr algn="ctr"/>
+            <a:endParaRPr lang="fr-FR"/>
+          </a:p>
+        </p:txBody>
+      </p:sp>
+      <p:sp>
+        <p:nvSpPr>
+          <p:cNvPr id="15" name="Organigramme : Connecteur 14"/>
+          <p:cNvSpPr/>
+          <p:nvPr/>
+        </p:nvSpPr>
+        <p:spPr>
+          <a:xfrm>
+            <a:off x="4932040" y="2979844"/>
+            <a:ext cx="171783" cy="144016"/>
+          </a:xfrm>
+          <a:prstGeom prst="flowChartConnector">
+            <a:avLst/>
+          </a:prstGeom>
+        </p:spPr>
+        <p:style>
+          <a:lnRef idx="2">
+            <a:schemeClr val="accent1">
+              <a:shade val="50000"/>
+            </a:schemeClr>
+          </a:lnRef>
+          <a:fillRef idx="1">
+            <a:schemeClr val="accent1"/>
+          </a:fillRef>
+          <a:effectRef idx="0">
+            <a:schemeClr val="accent1"/>
+          </a:effectRef>
+          <a:fontRef idx="minor">
+            <a:schemeClr val="lt1"/>
+          </a:fontRef>
+        </p:style>
+        <p:txBody>
+          <a:bodyPr rtlCol="0" anchor="ctr"/>
+          <a:lstStyle/>
+          <a:p>
+            <a:pPr algn="ctr"/>
+            <a:endParaRPr lang="fr-FR"/>
+          </a:p>
+        </p:txBody>
+      </p:sp>
+      <p:sp>
+        <p:nvSpPr>
+          <p:cNvPr id="16" name="Organigramme : Connecteur 15"/>
+          <p:cNvSpPr/>
+          <p:nvPr/>
+        </p:nvSpPr>
+        <p:spPr>
+          <a:xfrm>
+            <a:off x="4470800" y="4966109"/>
+            <a:ext cx="171783" cy="144016"/>
+          </a:xfrm>
+          <a:prstGeom prst="flowChartConnector">
+            <a:avLst/>
+          </a:prstGeom>
+        </p:spPr>
+        <p:style>
+          <a:lnRef idx="2">
+            <a:schemeClr val="accent1">
+              <a:shade val="50000"/>
+            </a:schemeClr>
+          </a:lnRef>
+          <a:fillRef idx="1">
+            <a:schemeClr val="accent1"/>
+          </a:fillRef>
+          <a:effectRef idx="0">
+            <a:schemeClr val="accent1"/>
+          </a:effectRef>
+          <a:fontRef idx="minor">
+            <a:schemeClr val="lt1"/>
+          </a:fontRef>
+        </p:style>
+        <p:txBody>
+          <a:bodyPr rtlCol="0" anchor="ctr"/>
+          <a:lstStyle/>
+          <a:p>
+            <a:pPr algn="ctr"/>
+            <a:endParaRPr lang="fr-FR"/>
+          </a:p>
+        </p:txBody>
+      </p:sp>
+      <p:sp>
+        <p:nvSpPr>
+          <p:cNvPr id="17" name="Organigramme : Connecteur 16"/>
+          <p:cNvSpPr/>
+          <p:nvPr/>
+        </p:nvSpPr>
+        <p:spPr>
+          <a:xfrm>
+            <a:off x="4709091" y="4974493"/>
+            <a:ext cx="171783" cy="144016"/>
+          </a:xfrm>
+          <a:prstGeom prst="flowChartConnector">
+            <a:avLst/>
+          </a:prstGeom>
+        </p:spPr>
+        <p:style>
+          <a:lnRef idx="2">
+            <a:schemeClr val="accent1">
+              <a:shade val="50000"/>
+            </a:schemeClr>
+          </a:lnRef>
+          <a:fillRef idx="1">
+            <a:schemeClr val="accent1"/>
+          </a:fillRef>
+          <a:effectRef idx="0">
+            <a:schemeClr val="accent1"/>
+          </a:effectRef>
+          <a:fontRef idx="minor">
+            <a:schemeClr val="lt1"/>
+          </a:fontRef>
+        </p:style>
+        <p:txBody>
+          <a:bodyPr rtlCol="0" anchor="ctr"/>
+          <a:lstStyle/>
+          <a:p>
+            <a:pPr algn="ctr"/>
+            <a:endParaRPr lang="fr-FR"/>
+          </a:p>
+        </p:txBody>
+      </p:sp>
+      <p:sp>
+        <p:nvSpPr>
+          <p:cNvPr id="18" name="Organigramme : Connecteur 17"/>
+          <p:cNvSpPr/>
+          <p:nvPr/>
+        </p:nvSpPr>
+        <p:spPr>
+          <a:xfrm>
+            <a:off x="4991119" y="4982909"/>
+            <a:ext cx="171783" cy="144016"/>
+          </a:xfrm>
+          <a:prstGeom prst="flowChartConnector">
+            <a:avLst/>
+          </a:prstGeom>
+        </p:spPr>
+        <p:style>
+          <a:lnRef idx="2">
+            <a:schemeClr val="accent1">
+              <a:shade val="50000"/>
+            </a:schemeClr>
+          </a:lnRef>
+          <a:fillRef idx="1">
+            <a:schemeClr val="accent1"/>
+          </a:fillRef>
+          <a:effectRef idx="0">
+            <a:schemeClr val="accent1"/>
+          </a:effectRef>
+          <a:fontRef idx="minor">
+            <a:schemeClr val="lt1"/>
+          </a:fontRef>
+        </p:style>
+        <p:txBody>
+          <a:bodyPr rtlCol="0" anchor="ctr"/>
+          <a:lstStyle/>
+          <a:p>
+            <a:pPr algn="ctr"/>
+            <a:endParaRPr lang="fr-FR"/>
+          </a:p>
+        </p:txBody>
+      </p:sp>
+      <p:sp>
+        <p:nvSpPr>
+          <p:cNvPr id="19" name="Étoile à 4 branches 18"/>
+          <p:cNvSpPr/>
+          <p:nvPr/>
+        </p:nvSpPr>
+        <p:spPr>
+          <a:xfrm>
+            <a:off x="1421650" y="2802228"/>
+            <a:ext cx="198022" cy="160816"/>
+          </a:xfrm>
+          <a:prstGeom prst="star4">
+            <a:avLst/>
+          </a:prstGeom>
+          <a:solidFill>
+            <a:srgbClr val="FF0000"/>
+          </a:solidFill>
+        </p:spPr>
+        <p:style>
+          <a:lnRef idx="2">
+            <a:schemeClr val="accent1">
+              <a:shade val="50000"/>
+            </a:schemeClr>
+          </a:lnRef>
+          <a:fillRef idx="1">
+            <a:schemeClr val="accent1"/>
+          </a:fillRef>
+          <a:effectRef idx="0">
+            <a:schemeClr val="accent1"/>
+          </a:effectRef>
+          <a:fontRef idx="minor">
+            <a:schemeClr val="lt1"/>
+          </a:fontRef>
+        </p:style>
+        <p:txBody>
+          <a:bodyPr rtlCol="0" anchor="ctr"/>
+          <a:lstStyle/>
+          <a:p>
+            <a:pPr algn="ctr"/>
+            <a:endParaRPr lang="fr-FR"/>
+          </a:p>
+        </p:txBody>
+      </p:sp>
+      <p:sp>
+        <p:nvSpPr>
+          <p:cNvPr id="20" name="Étoile à 4 branches 19"/>
+          <p:cNvSpPr/>
+          <p:nvPr/>
+        </p:nvSpPr>
+        <p:spPr>
+          <a:xfrm>
+            <a:off x="2987824" y="2819028"/>
+            <a:ext cx="198022" cy="160816"/>
+          </a:xfrm>
+          <a:prstGeom prst="star4">
+            <a:avLst/>
+          </a:prstGeom>
+          <a:solidFill>
+            <a:srgbClr val="FF0000"/>
+          </a:solidFill>
+        </p:spPr>
+        <p:style>
+          <a:lnRef idx="2">
+            <a:schemeClr val="accent1">
+              <a:shade val="50000"/>
+            </a:schemeClr>
+          </a:lnRef>
+          <a:fillRef idx="1">
+            <a:schemeClr val="accent1"/>
+          </a:fillRef>
+          <a:effectRef idx="0">
+            <a:schemeClr val="accent1"/>
+          </a:effectRef>
+          <a:fontRef idx="minor">
+            <a:schemeClr val="lt1"/>
+          </a:fontRef>
+        </p:style>
+        <p:txBody>
+          <a:bodyPr rtlCol="0" anchor="ctr"/>
+          <a:lstStyle/>
+          <a:p>
+            <a:pPr algn="ctr"/>
+            <a:endParaRPr lang="fr-FR"/>
+          </a:p>
+        </p:txBody>
+      </p:sp>
+      <p:sp>
+        <p:nvSpPr>
+          <p:cNvPr id="21" name="Étoile à 4 branches 20"/>
+          <p:cNvSpPr/>
+          <p:nvPr/>
+        </p:nvSpPr>
+        <p:spPr>
+          <a:xfrm>
+            <a:off x="5625117" y="2866678"/>
+            <a:ext cx="198022" cy="160816"/>
+          </a:xfrm>
+          <a:prstGeom prst="star4">
+            <a:avLst/>
+          </a:prstGeom>
+          <a:solidFill>
+            <a:srgbClr val="FF0000"/>
+          </a:solidFill>
+        </p:spPr>
+        <p:style>
+          <a:lnRef idx="2">
+            <a:schemeClr val="accent1">
+              <a:shade val="50000"/>
+            </a:schemeClr>
+          </a:lnRef>
+          <a:fillRef idx="1">
+            <a:schemeClr val="accent1"/>
+          </a:fillRef>
+          <a:effectRef idx="0">
+            <a:schemeClr val="accent1"/>
+          </a:effectRef>
+          <a:fontRef idx="minor">
+            <a:schemeClr val="lt1"/>
+          </a:fontRef>
+        </p:style>
+        <p:txBody>
+          <a:bodyPr rtlCol="0" anchor="ctr"/>
+          <a:lstStyle/>
+          <a:p>
+            <a:pPr algn="ctr"/>
+            <a:endParaRPr lang="fr-FR"/>
+          </a:p>
+        </p:txBody>
+      </p:sp>
+      <p:sp>
+        <p:nvSpPr>
+          <p:cNvPr id="22" name="Étoile à 4 branches 21"/>
+          <p:cNvSpPr/>
+          <p:nvPr/>
+        </p:nvSpPr>
+        <p:spPr>
+          <a:xfrm>
+            <a:off x="1376028" y="4805293"/>
+            <a:ext cx="198022" cy="160816"/>
+          </a:xfrm>
+          <a:prstGeom prst="star4">
+            <a:avLst/>
+          </a:prstGeom>
+          <a:solidFill>
+            <a:srgbClr val="FF0000"/>
+          </a:solidFill>
+        </p:spPr>
+        <p:style>
+          <a:lnRef idx="2">
+            <a:schemeClr val="accent1">
+              <a:shade val="50000"/>
+            </a:schemeClr>
+          </a:lnRef>
+          <a:fillRef idx="1">
+            <a:schemeClr val="accent1"/>
+          </a:fillRef>
+          <a:effectRef idx="0">
+            <a:schemeClr val="accent1"/>
+          </a:effectRef>
+          <a:fontRef idx="minor">
+            <a:schemeClr val="lt1"/>
+          </a:fontRef>
+        </p:style>
+        <p:txBody>
+          <a:bodyPr rtlCol="0" anchor="ctr"/>
+          <a:lstStyle/>
+          <a:p>
+            <a:pPr algn="ctr"/>
+            <a:endParaRPr lang="fr-FR"/>
+          </a:p>
+        </p:txBody>
+      </p:sp>
+      <p:sp>
+        <p:nvSpPr>
+          <p:cNvPr id="23" name="Étoile à 4 branches 22"/>
+          <p:cNvSpPr/>
+          <p:nvPr/>
+        </p:nvSpPr>
+        <p:spPr>
+          <a:xfrm>
+            <a:off x="3086835" y="4797751"/>
+            <a:ext cx="198022" cy="160816"/>
+          </a:xfrm>
+          <a:prstGeom prst="star4">
+            <a:avLst/>
+          </a:prstGeom>
+          <a:solidFill>
+            <a:srgbClr val="FF0000"/>
+          </a:solidFill>
+        </p:spPr>
+        <p:style>
+          <a:lnRef idx="2">
+            <a:schemeClr val="accent1">
+              <a:shade val="50000"/>
+            </a:schemeClr>
+          </a:lnRef>
+          <a:fillRef idx="1">
+            <a:schemeClr val="accent1"/>
+          </a:fillRef>
+          <a:effectRef idx="0">
+            <a:schemeClr val="accent1"/>
+          </a:effectRef>
+          <a:fontRef idx="minor">
+            <a:schemeClr val="lt1"/>
+          </a:fontRef>
+        </p:style>
+        <p:txBody>
+          <a:bodyPr rtlCol="0" anchor="ctr"/>
+          <a:lstStyle/>
+          <a:p>
+            <a:pPr algn="ctr"/>
+            <a:endParaRPr lang="fr-FR"/>
+          </a:p>
+        </p:txBody>
+      </p:sp>
+      <p:sp>
+        <p:nvSpPr>
+          <p:cNvPr id="24" name="Étoile à 4 branches 23"/>
+          <p:cNvSpPr/>
+          <p:nvPr/>
+        </p:nvSpPr>
+        <p:spPr>
+          <a:xfrm>
+            <a:off x="5623202" y="4781663"/>
+            <a:ext cx="198022" cy="160816"/>
+          </a:xfrm>
+          <a:prstGeom prst="star4">
+            <a:avLst/>
+          </a:prstGeom>
+          <a:solidFill>
+            <a:srgbClr val="FF0000"/>
+          </a:solidFill>
+        </p:spPr>
+        <p:style>
+          <a:lnRef idx="2">
+            <a:schemeClr val="accent1">
+              <a:shade val="50000"/>
+            </a:schemeClr>
+          </a:lnRef>
+          <a:fillRef idx="1">
+            <a:schemeClr val="accent1"/>
+          </a:fillRef>
+          <a:effectRef idx="0">
+            <a:schemeClr val="accent1"/>
+          </a:effectRef>
+          <a:fontRef idx="minor">
+            <a:schemeClr val="lt1"/>
+          </a:fontRef>
+        </p:style>
+        <p:txBody>
+          <a:bodyPr rtlCol="0" anchor="ctr"/>
+          <a:lstStyle/>
+          <a:p>
+            <a:pPr algn="ctr"/>
+            <a:endParaRPr lang="fr-FR"/>
+          </a:p>
+        </p:txBody>
+      </p:sp>
+      <p:sp>
+        <p:nvSpPr>
+          <p:cNvPr id="25" name="ZoneTexte 24"/>
+          <p:cNvSpPr txBox="1"/>
+          <p:nvPr/>
+        </p:nvSpPr>
+        <p:spPr>
+          <a:xfrm>
+            <a:off x="1304637" y="2500119"/>
+            <a:ext cx="432048" cy="261610"/>
+          </a:xfrm>
+          <a:prstGeom prst="rect">
+            <a:avLst/>
+          </a:prstGeom>
+          <a:noFill/>
+        </p:spPr>
+        <p:txBody>
+          <a:bodyPr wrap="square" rtlCol="0">
+            <a:spAutoFit/>
+          </a:bodyPr>
+          <a:lstStyle/>
+          <a:p>
+            <a:r>
+              <a:rPr lang="fr-FR" sz="1100" b="1" dirty="0" smtClean="0">
+                <a:solidFill>
+                  <a:schemeClr val="tx2"/>
+                </a:solidFill>
+              </a:rPr>
+              <a:t>(</a:t>
+            </a:r>
+            <a:r>
+              <a:rPr lang="fr-FR" sz="1100" b="1" dirty="0" err="1" smtClean="0">
+                <a:solidFill>
+                  <a:schemeClr val="tx2"/>
+                </a:solidFill>
+              </a:rPr>
+              <a:t>i,j</a:t>
+            </a:r>
+            <a:r>
+              <a:rPr lang="fr-FR" sz="1100" b="1" dirty="0" smtClean="0">
+                <a:solidFill>
+                  <a:schemeClr val="tx2"/>
+                </a:solidFill>
+              </a:rPr>
+              <a:t>)</a:t>
+            </a:r>
+            <a:endParaRPr lang="fr-FR" sz="1100" b="1" dirty="0">
+              <a:solidFill>
+                <a:schemeClr val="tx2"/>
+              </a:solidFill>
+            </a:endParaRPr>
+          </a:p>
+        </p:txBody>
+      </p:sp>
+      <p:sp>
+        <p:nvSpPr>
+          <p:cNvPr id="26" name="ZoneTexte 25"/>
+          <p:cNvSpPr txBox="1"/>
+          <p:nvPr/>
+        </p:nvSpPr>
+        <p:spPr>
+          <a:xfrm>
+            <a:off x="2871789" y="2507945"/>
+            <a:ext cx="432048" cy="261610"/>
+          </a:xfrm>
+          <a:prstGeom prst="rect">
+            <a:avLst/>
+          </a:prstGeom>
+          <a:noFill/>
+        </p:spPr>
+        <p:txBody>
+          <a:bodyPr wrap="square" rtlCol="0">
+            <a:spAutoFit/>
+          </a:bodyPr>
+          <a:lstStyle/>
+          <a:p>
+            <a:r>
+              <a:rPr lang="fr-FR" sz="1100" b="1" dirty="0" smtClean="0">
+                <a:solidFill>
+                  <a:schemeClr val="tx2"/>
+                </a:solidFill>
+              </a:rPr>
+              <a:t>(</a:t>
+            </a:r>
+            <a:r>
+              <a:rPr lang="fr-FR" sz="1100" b="1" dirty="0" err="1" smtClean="0">
+                <a:solidFill>
+                  <a:schemeClr val="tx2"/>
+                </a:solidFill>
+              </a:rPr>
+              <a:t>i,j</a:t>
+            </a:r>
+            <a:r>
+              <a:rPr lang="fr-FR" sz="1100" b="1" dirty="0" smtClean="0">
+                <a:solidFill>
+                  <a:schemeClr val="tx2"/>
+                </a:solidFill>
+              </a:rPr>
+              <a:t>)</a:t>
+            </a:r>
+            <a:endParaRPr lang="fr-FR" sz="1100" b="1" dirty="0">
+              <a:solidFill>
+                <a:schemeClr val="tx2"/>
+              </a:solidFill>
+            </a:endParaRPr>
+          </a:p>
+        </p:txBody>
+      </p:sp>
+      <p:sp>
+        <p:nvSpPr>
+          <p:cNvPr id="27" name="ZoneTexte 26"/>
+          <p:cNvSpPr txBox="1"/>
+          <p:nvPr/>
+        </p:nvSpPr>
+        <p:spPr>
+          <a:xfrm>
+            <a:off x="5508104" y="2526558"/>
+            <a:ext cx="432048" cy="261610"/>
+          </a:xfrm>
+          <a:prstGeom prst="rect">
+            <a:avLst/>
+          </a:prstGeom>
+          <a:noFill/>
+        </p:spPr>
+        <p:txBody>
+          <a:bodyPr wrap="square" rtlCol="0">
+            <a:spAutoFit/>
+          </a:bodyPr>
+          <a:lstStyle/>
+          <a:p>
+            <a:r>
+              <a:rPr lang="fr-FR" sz="1100" b="1" dirty="0" smtClean="0">
+                <a:solidFill>
+                  <a:schemeClr val="tx2"/>
+                </a:solidFill>
+              </a:rPr>
+              <a:t>(</a:t>
+            </a:r>
+            <a:r>
+              <a:rPr lang="fr-FR" sz="1100" b="1" dirty="0" err="1" smtClean="0">
+                <a:solidFill>
+                  <a:schemeClr val="tx2"/>
+                </a:solidFill>
+              </a:rPr>
+              <a:t>i,j</a:t>
+            </a:r>
+            <a:r>
+              <a:rPr lang="fr-FR" sz="1100" b="1" dirty="0" smtClean="0">
+                <a:solidFill>
+                  <a:schemeClr val="tx2"/>
+                </a:solidFill>
+              </a:rPr>
+              <a:t>)</a:t>
+            </a:r>
+            <a:endParaRPr lang="fr-FR" sz="1100" b="1" dirty="0">
+              <a:solidFill>
+                <a:schemeClr val="tx2"/>
+              </a:solidFill>
+            </a:endParaRPr>
+          </a:p>
+        </p:txBody>
+      </p:sp>
+      <p:sp>
+        <p:nvSpPr>
+          <p:cNvPr id="28" name="ZoneTexte 27"/>
+          <p:cNvSpPr txBox="1"/>
+          <p:nvPr/>
+        </p:nvSpPr>
+        <p:spPr>
+          <a:xfrm>
+            <a:off x="1259993" y="4437112"/>
+            <a:ext cx="432048" cy="261610"/>
+          </a:xfrm>
+          <a:prstGeom prst="rect">
+            <a:avLst/>
+          </a:prstGeom>
+          <a:noFill/>
+        </p:spPr>
+        <p:txBody>
+          <a:bodyPr wrap="square" rtlCol="0">
+            <a:spAutoFit/>
+          </a:bodyPr>
+          <a:lstStyle/>
+          <a:p>
+            <a:r>
+              <a:rPr lang="fr-FR" sz="1100" b="1" dirty="0" smtClean="0">
+                <a:solidFill>
+                  <a:schemeClr val="tx2"/>
+                </a:solidFill>
+              </a:rPr>
+              <a:t>(</a:t>
+            </a:r>
+            <a:r>
+              <a:rPr lang="fr-FR" sz="1100" b="1" dirty="0" err="1" smtClean="0">
+                <a:solidFill>
+                  <a:schemeClr val="tx2"/>
+                </a:solidFill>
+              </a:rPr>
+              <a:t>i,j</a:t>
+            </a:r>
+            <a:r>
+              <a:rPr lang="fr-FR" sz="1100" b="1" dirty="0" smtClean="0">
+                <a:solidFill>
+                  <a:schemeClr val="tx2"/>
+                </a:solidFill>
+              </a:rPr>
+              <a:t>)</a:t>
+            </a:r>
+            <a:endParaRPr lang="fr-FR" sz="1100" b="1" dirty="0">
+              <a:solidFill>
+                <a:schemeClr val="tx2"/>
+              </a:solidFill>
+            </a:endParaRPr>
+          </a:p>
+        </p:txBody>
+      </p:sp>
+      <p:sp>
+        <p:nvSpPr>
+          <p:cNvPr id="29" name="ZoneTexte 28"/>
+          <p:cNvSpPr txBox="1"/>
+          <p:nvPr/>
+        </p:nvSpPr>
+        <p:spPr>
+          <a:xfrm>
+            <a:off x="2969822" y="4437112"/>
+            <a:ext cx="432048" cy="261610"/>
+          </a:xfrm>
+          <a:prstGeom prst="rect">
+            <a:avLst/>
+          </a:prstGeom>
+          <a:noFill/>
+        </p:spPr>
+        <p:txBody>
+          <a:bodyPr wrap="square" rtlCol="0">
+            <a:spAutoFit/>
+          </a:bodyPr>
+          <a:lstStyle/>
+          <a:p>
+            <a:r>
+              <a:rPr lang="fr-FR" sz="1100" b="1" dirty="0" smtClean="0">
+                <a:solidFill>
+                  <a:schemeClr val="tx2"/>
+                </a:solidFill>
+              </a:rPr>
+              <a:t>(</a:t>
+            </a:r>
+            <a:r>
+              <a:rPr lang="fr-FR" sz="1100" b="1" dirty="0" err="1" smtClean="0">
+                <a:solidFill>
+                  <a:schemeClr val="tx2"/>
+                </a:solidFill>
+              </a:rPr>
+              <a:t>i,j</a:t>
+            </a:r>
+            <a:r>
+              <a:rPr lang="fr-FR" sz="1100" b="1" dirty="0" smtClean="0">
+                <a:solidFill>
+                  <a:schemeClr val="tx2"/>
+                </a:solidFill>
+              </a:rPr>
+              <a:t>)</a:t>
+            </a:r>
+            <a:endParaRPr lang="fr-FR" sz="1100" b="1" dirty="0">
+              <a:solidFill>
+                <a:schemeClr val="tx2"/>
+              </a:solidFill>
+            </a:endParaRPr>
+          </a:p>
+        </p:txBody>
+      </p:sp>
+      <p:sp>
+        <p:nvSpPr>
+          <p:cNvPr id="30" name="ZoneTexte 29"/>
+          <p:cNvSpPr txBox="1"/>
+          <p:nvPr/>
+        </p:nvSpPr>
+        <p:spPr>
+          <a:xfrm>
+            <a:off x="5508104" y="4428187"/>
+            <a:ext cx="432048" cy="261610"/>
+          </a:xfrm>
+          <a:prstGeom prst="rect">
+            <a:avLst/>
+          </a:prstGeom>
+          <a:noFill/>
+        </p:spPr>
+        <p:txBody>
+          <a:bodyPr wrap="square" rtlCol="0">
+            <a:spAutoFit/>
+          </a:bodyPr>
+          <a:lstStyle/>
+          <a:p>
+            <a:r>
+              <a:rPr lang="fr-FR" sz="1100" b="1" dirty="0" smtClean="0">
+                <a:solidFill>
+                  <a:schemeClr val="tx2"/>
+                </a:solidFill>
+              </a:rPr>
+              <a:t>(</a:t>
+            </a:r>
+            <a:r>
+              <a:rPr lang="fr-FR" sz="1100" b="1" dirty="0" err="1" smtClean="0">
+                <a:solidFill>
+                  <a:schemeClr val="tx2"/>
+                </a:solidFill>
+              </a:rPr>
+              <a:t>i,j</a:t>
+            </a:r>
+            <a:r>
+              <a:rPr lang="fr-FR" sz="1100" b="1" dirty="0" smtClean="0">
+                <a:solidFill>
+                  <a:schemeClr val="tx2"/>
+                </a:solidFill>
+              </a:rPr>
+              <a:t>)</a:t>
+            </a:r>
+            <a:endParaRPr lang="fr-FR" sz="1100" b="1" dirty="0">
+              <a:solidFill>
+                <a:schemeClr val="tx2"/>
+              </a:solidFill>
+            </a:endParaRPr>
+          </a:p>
+        </p:txBody>
+      </p:sp>
+      <p:sp>
+        <p:nvSpPr>
+          <p:cNvPr id="31" name="Accolade fermante 30"/>
+          <p:cNvSpPr/>
+          <p:nvPr/>
+        </p:nvSpPr>
+        <p:spPr>
+          <a:xfrm>
+            <a:off x="6840981" y="2132856"/>
+            <a:ext cx="539331" cy="3600400"/>
+          </a:xfrm>
+          <a:prstGeom prst="rightBrace">
+            <a:avLst/>
+          </a:prstGeom>
+        </p:spPr>
+        <p:style>
+          <a:lnRef idx="1">
+            <a:schemeClr val="accent1"/>
+          </a:lnRef>
+          <a:fillRef idx="0">
+            <a:schemeClr val="accent1"/>
+          </a:fillRef>
+          <a:effectRef idx="0">
+            <a:schemeClr val="accent1"/>
+          </a:effectRef>
+          <a:fontRef idx="minor">
+            <a:schemeClr val="tx1"/>
+          </a:fontRef>
+        </p:style>
+        <p:txBody>
+          <a:bodyPr rtlCol="0" anchor="ctr"/>
+          <a:lstStyle/>
+          <a:p>
+            <a:pPr algn="ctr"/>
+            <a:endParaRPr lang="fr-FR"/>
+          </a:p>
+        </p:txBody>
+      </p:sp>
+      <p:sp>
+        <p:nvSpPr>
+          <p:cNvPr id="32" name="ZoneTexte 31"/>
+          <p:cNvSpPr txBox="1"/>
+          <p:nvPr/>
+        </p:nvSpPr>
+        <p:spPr>
+          <a:xfrm>
+            <a:off x="7390362" y="3717612"/>
+            <a:ext cx="1512168" cy="430887"/>
+          </a:xfrm>
+          <a:prstGeom prst="rect">
+            <a:avLst/>
+          </a:prstGeom>
+          <a:noFill/>
+        </p:spPr>
+        <p:txBody>
+          <a:bodyPr wrap="square" rtlCol="0">
+            <a:spAutoFit/>
+          </a:bodyPr>
+          <a:lstStyle/>
+          <a:p>
+            <a:r>
+              <a:rPr lang="fr-FR" sz="1100" dirty="0" smtClean="0"/>
+              <a:t>Estimation des </a:t>
+            </a:r>
+            <a:r>
+              <a:rPr lang="fr-FR" sz="1100" dirty="0" err="1" smtClean="0"/>
+              <a:t>brdf</a:t>
+            </a:r>
+            <a:r>
+              <a:rPr lang="fr-FR" sz="1100" dirty="0" smtClean="0"/>
+              <a:t> qu’on va optimiser</a:t>
+            </a:r>
+            <a:endParaRPr lang="fr-FR" sz="1100" dirty="0"/>
+          </a:p>
+        </p:txBody>
+      </p:sp>
+    </p:spTree>
+    <p:extLst>
+      <p:ext uri="{BB962C8B-B14F-4D97-AF65-F5344CB8AC3E}">
+        <p14:creationId xmlns:p14="http://schemas.microsoft.com/office/powerpoint/2010/main" val="4086423897"/>
       </p:ext>
     </p:extLst>
   </p:cSld>

</xml_diff>